<commit_message>
derniere mise à jour
</commit_message>
<xml_diff>
--- a/jour 1/Accessibilite_concevoir_Web_master2_2021.pptx
+++ b/jour 1/Accessibilite_concevoir_Web_master2_2021.pptx
@@ -6,10 +6,10 @@
     <p:sldMasterId id="2147483767" r:id="rId2"/>
   </p:sldMasterIdLst>
   <p:notesMasterIdLst>
-    <p:notesMasterId r:id="rId61"/>
+    <p:notesMasterId r:id="rId60"/>
   </p:notesMasterIdLst>
   <p:handoutMasterIdLst>
-    <p:handoutMasterId r:id="rId62"/>
+    <p:handoutMasterId r:id="rId61"/>
   </p:handoutMasterIdLst>
   <p:sldIdLst>
     <p:sldId id="274" r:id="rId3"/>
@@ -44,37 +44,36 @@
     <p:sldId id="334" r:id="rId32"/>
     <p:sldId id="473" r:id="rId33"/>
     <p:sldId id="570" r:id="rId34"/>
-    <p:sldId id="583" r:id="rId35"/>
-    <p:sldId id="571" r:id="rId36"/>
-    <p:sldId id="530" r:id="rId37"/>
-    <p:sldId id="553" r:id="rId38"/>
-    <p:sldId id="495" r:id="rId39"/>
-    <p:sldId id="525" r:id="rId40"/>
-    <p:sldId id="527" r:id="rId41"/>
-    <p:sldId id="554" r:id="rId42"/>
-    <p:sldId id="484" r:id="rId43"/>
-    <p:sldId id="528" r:id="rId44"/>
-    <p:sldId id="529" r:id="rId45"/>
-    <p:sldId id="486" r:id="rId46"/>
-    <p:sldId id="572" r:id="rId47"/>
-    <p:sldId id="542" r:id="rId48"/>
-    <p:sldId id="557" r:id="rId49"/>
-    <p:sldId id="372" r:id="rId50"/>
-    <p:sldId id="373" r:id="rId51"/>
-    <p:sldId id="578" r:id="rId52"/>
-    <p:sldId id="586" r:id="rId53"/>
-    <p:sldId id="580" r:id="rId54"/>
-    <p:sldId id="581" r:id="rId55"/>
-    <p:sldId id="598" r:id="rId56"/>
-    <p:sldId id="597" r:id="rId57"/>
-    <p:sldId id="438" r:id="rId58"/>
-    <p:sldId id="596" r:id="rId59"/>
-    <p:sldId id="365" r:id="rId60"/>
+    <p:sldId id="571" r:id="rId35"/>
+    <p:sldId id="530" r:id="rId36"/>
+    <p:sldId id="553" r:id="rId37"/>
+    <p:sldId id="495" r:id="rId38"/>
+    <p:sldId id="525" r:id="rId39"/>
+    <p:sldId id="527" r:id="rId40"/>
+    <p:sldId id="554" r:id="rId41"/>
+    <p:sldId id="484" r:id="rId42"/>
+    <p:sldId id="528" r:id="rId43"/>
+    <p:sldId id="529" r:id="rId44"/>
+    <p:sldId id="486" r:id="rId45"/>
+    <p:sldId id="572" r:id="rId46"/>
+    <p:sldId id="542" r:id="rId47"/>
+    <p:sldId id="557" r:id="rId48"/>
+    <p:sldId id="372" r:id="rId49"/>
+    <p:sldId id="373" r:id="rId50"/>
+    <p:sldId id="578" r:id="rId51"/>
+    <p:sldId id="586" r:id="rId52"/>
+    <p:sldId id="580" r:id="rId53"/>
+    <p:sldId id="581" r:id="rId54"/>
+    <p:sldId id="598" r:id="rId55"/>
+    <p:sldId id="597" r:id="rId56"/>
+    <p:sldId id="438" r:id="rId57"/>
+    <p:sldId id="596" r:id="rId58"/>
+    <p:sldId id="365" r:id="rId59"/>
   </p:sldIdLst>
   <p:sldSz cx="9144000" cy="5143500" type="screen16x9"/>
   <p:notesSz cx="7099300" cy="10234613"/>
   <p:custDataLst>
-    <p:tags r:id="rId63"/>
+    <p:tags r:id="rId62"/>
   </p:custDataLst>
   <p:defaultTextStyle>
     <a:defPPr>
@@ -238,7 +237,6 @@
             <p14:sldId id="334"/>
             <p14:sldId id="473"/>
             <p14:sldId id="570"/>
-            <p14:sldId id="583"/>
             <p14:sldId id="571"/>
             <p14:sldId id="530"/>
             <p14:sldId id="553"/>
@@ -457,7 +455,7 @@
           <a:p>
             <a:fld id="{F0CC824B-B566-4F9E-8E0B-192AC83AB3F4}" type="datetimeFigureOut">
               <a:rPr lang="en-GB" smtClean="0"/>
-              <a:t>29/11/2021</a:t>
+              <a:t>14/12/2021</a:t>
             </a:fld>
             <a:endParaRPr lang="en-GB" dirty="0"/>
           </a:p>
@@ -21580,161 +21578,6 @@
                   <a:schemeClr val="tx1"/>
                 </a:solidFill>
               </a:rPr>
-              <a:t> 	   Difficile à utiliser avec la souris</a:t>
-            </a:r>
-          </a:p>
-        </p:txBody>
-      </p:sp>
-      <p:pic>
-        <p:nvPicPr>
-          <p:cNvPr id="7" name="Image 6"/>
-          <p:cNvPicPr>
-            <a:picLocks noChangeAspect="1"/>
-          </p:cNvPicPr>
-          <p:nvPr/>
-        </p:nvPicPr>
-        <p:blipFill>
-          <a:blip r:embed="rId2">
-            <a:extLst>
-              <a:ext uri="{28A0092B-C50C-407E-A947-70E740481C1C}">
-                <a14:useLocalDpi xmlns:a14="http://schemas.microsoft.com/office/drawing/2010/main" val="0"/>
-              </a:ext>
-            </a:extLst>
-          </a:blip>
-          <a:stretch>
-            <a:fillRect/>
-          </a:stretch>
-        </p:blipFill>
-        <p:spPr>
-          <a:xfrm>
-            <a:off x="618814" y="1275606"/>
-            <a:ext cx="366618" cy="293294"/>
-          </a:xfrm>
-          <a:prstGeom prst="rect">
-            <a:avLst/>
-          </a:prstGeom>
-        </p:spPr>
-      </p:pic>
-      <p:pic>
-        <p:nvPicPr>
-          <p:cNvPr id="5" name="Image 4"/>
-          <p:cNvPicPr/>
-          <p:nvPr/>
-        </p:nvPicPr>
-        <p:blipFill>
-          <a:blip r:embed="rId3"/>
-          <a:stretch>
-            <a:fillRect/>
-          </a:stretch>
-        </p:blipFill>
-        <p:spPr>
-          <a:xfrm>
-            <a:off x="611559" y="1851670"/>
-            <a:ext cx="7632851" cy="1199349"/>
-          </a:xfrm>
-          <a:prstGeom prst="rect">
-            <a:avLst/>
-          </a:prstGeom>
-        </p:spPr>
-      </p:pic>
-    </p:spTree>
-    <p:extLst>
-      <p:ext uri="{BB962C8B-B14F-4D97-AF65-F5344CB8AC3E}">
-        <p14:creationId xmlns:p14="http://schemas.microsoft.com/office/powerpoint/2010/main" val="3477642349"/>
-      </p:ext>
-    </p:extLst>
-  </p:cSld>
-  <p:clrMapOvr>
-    <a:masterClrMapping/>
-  </p:clrMapOvr>
-  <p:transition spd="med">
-    <p:fade/>
-  </p:transition>
-</p:sld>
-</file>
-
-<file path=ppt/slides/slide34.xml><?xml version="1.0" encoding="utf-8"?>
-<p:sld xmlns:a="http://schemas.openxmlformats.org/drawingml/2006/main" xmlns:r="http://schemas.openxmlformats.org/officeDocument/2006/relationships" xmlns:p="http://schemas.openxmlformats.org/presentationml/2006/main">
-  <p:cSld>
-    <p:spTree>
-      <p:nvGrpSpPr>
-        <p:cNvPr id="1" name=""/>
-        <p:cNvGrpSpPr/>
-        <p:nvPr/>
-      </p:nvGrpSpPr>
-      <p:grpSpPr>
-        <a:xfrm>
-          <a:off x="0" y="0"/>
-          <a:ext cx="0" cy="0"/>
-          <a:chOff x="0" y="0"/>
-          <a:chExt cx="0" cy="0"/>
-        </a:xfrm>
-      </p:grpSpPr>
-      <p:sp>
-        <p:nvSpPr>
-          <p:cNvPr id="2" name="Espace réservé du contenu 1"/>
-          <p:cNvSpPr>
-            <a:spLocks noGrp="1"/>
-          </p:cNvSpPr>
-          <p:nvPr>
-            <p:ph idx="1"/>
-          </p:nvPr>
-        </p:nvSpPr>
-        <p:spPr>
-          <a:xfrm>
-            <a:off x="345968" y="339502"/>
-            <a:ext cx="8470899" cy="4130675"/>
-          </a:xfrm>
-          <a:noFill/>
-          <a:extLst>
-            <a:ext uri="{909E8E84-426E-40DD-AFC4-6F175D3DCCD1}">
-              <a14:hiddenFill xmlns:a14="http://schemas.microsoft.com/office/drawing/2010/main">
-                <a:solidFill>
-                  <a:srgbClr val="FFFFFF"/>
-                </a:solidFill>
-              </a14:hiddenFill>
-            </a:ext>
-          </a:extLst>
-        </p:spPr>
-        <p:txBody>
-          <a:bodyPr/>
-          <a:lstStyle/>
-          <a:p>
-            <a:r>
-              <a:rPr lang="fr-FR" sz="2000" dirty="0"/>
-              <a:t>Rendre le focus visible en toute circonstance</a:t>
-            </a:r>
-          </a:p>
-          <a:p>
-            <a:endParaRPr lang="fr-FR" sz="2000" dirty="0"/>
-          </a:p>
-          <a:p>
-            <a:endParaRPr lang="fr-FR" sz="2000" dirty="0"/>
-          </a:p>
-          <a:p>
-            <a:pPr>
-              <a:lnSpc>
-                <a:spcPct val="100000"/>
-              </a:lnSpc>
-            </a:pPr>
-            <a:endParaRPr lang="fr-FR" sz="1400" dirty="0">
-              <a:solidFill>
-                <a:schemeClr val="tx1"/>
-              </a:solidFill>
-            </a:endParaRPr>
-          </a:p>
-          <a:p>
-            <a:pPr>
-              <a:lnSpc>
-                <a:spcPct val="100000"/>
-              </a:lnSpc>
-            </a:pPr>
-            <a:r>
-              <a:rPr lang="fr-FR" sz="1400" dirty="0">
-                <a:solidFill>
-                  <a:schemeClr val="tx1"/>
-                </a:solidFill>
-              </a:rPr>
               <a:t>	   Le bouton en forme de « cloche » et le nom de l’utilisateur ne sont pas </a:t>
             </a:r>
             <a:r>
@@ -21824,7 +21667,7 @@
 </p:sld>
 </file>
 
-<file path=ppt/slides/slide35.xml><?xml version="1.0" encoding="utf-8"?>
+<file path=ppt/slides/slide34.xml><?xml version="1.0" encoding="utf-8"?>
 <p:sld xmlns:a="http://schemas.openxmlformats.org/drawingml/2006/main" xmlns:r="http://schemas.openxmlformats.org/officeDocument/2006/relationships" xmlns:p="http://schemas.openxmlformats.org/presentationml/2006/main">
   <p:cSld>
     <p:spTree>
@@ -22585,7 +22428,7 @@
 </p:sld>
 </file>
 
-<file path=ppt/slides/slide36.xml><?xml version="1.0" encoding="utf-8"?>
+<file path=ppt/slides/slide35.xml><?xml version="1.0" encoding="utf-8"?>
 <p:sld xmlns:a="http://schemas.openxmlformats.org/drawingml/2006/main" xmlns:r="http://schemas.openxmlformats.org/officeDocument/2006/relationships" xmlns:p="http://schemas.openxmlformats.org/presentationml/2006/main">
   <p:cSld>
     <p:spTree>
@@ -22951,7 +22794,7 @@
 </p:sld>
 </file>
 
-<file path=ppt/slides/slide37.xml><?xml version="1.0" encoding="utf-8"?>
+<file path=ppt/slides/slide36.xml><?xml version="1.0" encoding="utf-8"?>
 <p:sld xmlns:a="http://schemas.openxmlformats.org/drawingml/2006/main" xmlns:r="http://schemas.openxmlformats.org/officeDocument/2006/relationships" xmlns:p="http://schemas.openxmlformats.org/presentationml/2006/main">
   <p:cSld>
     <p:spTree>
@@ -23247,7 +23090,7 @@
 </p:sld>
 </file>
 
-<file path=ppt/slides/slide38.xml><?xml version="1.0" encoding="utf-8"?>
+<file path=ppt/slides/slide37.xml><?xml version="1.0" encoding="utf-8"?>
 <p:sld xmlns:a="http://schemas.openxmlformats.org/drawingml/2006/main" xmlns:r="http://schemas.openxmlformats.org/officeDocument/2006/relationships" xmlns:p="http://schemas.openxmlformats.org/presentationml/2006/main">
   <p:cSld>
     <p:spTree>
@@ -24692,7 +24535,7 @@
 </p:sld>
 </file>
 
-<file path=ppt/slides/slide39.xml><?xml version="1.0" encoding="utf-8"?>
+<file path=ppt/slides/slide38.xml><?xml version="1.0" encoding="utf-8"?>
 <p:sld xmlns:a="http://schemas.openxmlformats.org/drawingml/2006/main" xmlns:r="http://schemas.openxmlformats.org/officeDocument/2006/relationships" xmlns:p="http://schemas.openxmlformats.org/presentationml/2006/main">
   <p:cSld>
     <p:spTree>
@@ -24914,6 +24757,383 @@
       </p:par>
     </p:tnLst>
   </p:timing>
+</p:sld>
+</file>
+
+<file path=ppt/slides/slide39.xml><?xml version="1.0" encoding="utf-8"?>
+<p:sld xmlns:a="http://schemas.openxmlformats.org/drawingml/2006/main" xmlns:r="http://schemas.openxmlformats.org/officeDocument/2006/relationships" xmlns:p="http://schemas.openxmlformats.org/presentationml/2006/main">
+  <p:cSld>
+    <p:spTree>
+      <p:nvGrpSpPr>
+        <p:cNvPr id="1" name=""/>
+        <p:cNvGrpSpPr/>
+        <p:nvPr/>
+      </p:nvGrpSpPr>
+      <p:grpSpPr>
+        <a:xfrm>
+          <a:off x="0" y="0"/>
+          <a:ext cx="0" cy="0"/>
+          <a:chOff x="0" y="0"/>
+          <a:chExt cx="0" cy="0"/>
+        </a:xfrm>
+      </p:grpSpPr>
+      <p:sp>
+        <p:nvSpPr>
+          <p:cNvPr id="2" name="Espace réservé du contenu 1"/>
+          <p:cNvSpPr>
+            <a:spLocks noGrp="1"/>
+          </p:cNvSpPr>
+          <p:nvPr>
+            <p:ph idx="1"/>
+          </p:nvPr>
+        </p:nvSpPr>
+        <p:spPr/>
+        <p:txBody>
+          <a:bodyPr/>
+          <a:lstStyle/>
+          <a:p>
+            <a:r>
+              <a:rPr lang="fr-FR" dirty="0"/>
+              <a:t>Quelques recommandations</a:t>
+            </a:r>
+          </a:p>
+        </p:txBody>
+      </p:sp>
+      <p:pic>
+        <p:nvPicPr>
+          <p:cNvPr id="3" name="Picture 4" descr="U155516_en"/>
+          <p:cNvPicPr>
+            <a:picLocks noChangeAspect="1" noChangeArrowheads="1"/>
+          </p:cNvPicPr>
+          <p:nvPr/>
+        </p:nvPicPr>
+        <p:blipFill>
+          <a:blip r:embed="rId2" cstate="print">
+            <a:extLst>
+              <a:ext uri="{28A0092B-C50C-407E-A947-70E740481C1C}">
+                <a14:useLocalDpi xmlns:a14="http://schemas.microsoft.com/office/drawing/2010/main" val="0"/>
+              </a:ext>
+            </a:extLst>
+          </a:blip>
+          <a:srcRect/>
+          <a:stretch>
+            <a:fillRect/>
+          </a:stretch>
+        </p:blipFill>
+        <p:spPr bwMode="auto">
+          <a:xfrm>
+            <a:off x="5436096" y="1275606"/>
+            <a:ext cx="2520280" cy="2000635"/>
+          </a:xfrm>
+          <a:prstGeom prst="rect">
+            <a:avLst/>
+          </a:prstGeom>
+          <a:noFill/>
+          <a:ln>
+            <a:noFill/>
+          </a:ln>
+          <a:extLst>
+            <a:ext uri="{909E8E84-426E-40DD-AFC4-6F175D3DCCD1}">
+              <a14:hiddenFill xmlns:a14="http://schemas.microsoft.com/office/drawing/2010/main">
+                <a:solidFill>
+                  <a:srgbClr val="FFFFFF"/>
+                </a:solidFill>
+              </a14:hiddenFill>
+            </a:ext>
+            <a:ext uri="{91240B29-F687-4F45-9708-019B960494DF}">
+              <a14:hiddenLine xmlns:a14="http://schemas.microsoft.com/office/drawing/2010/main" w="9525">
+                <a:solidFill>
+                  <a:srgbClr val="000000"/>
+                </a:solidFill>
+                <a:miter lim="800000"/>
+                <a:headEnd/>
+                <a:tailEnd/>
+              </a14:hiddenLine>
+            </a:ext>
+          </a:extLst>
+        </p:spPr>
+      </p:pic>
+      <p:sp>
+        <p:nvSpPr>
+          <p:cNvPr id="4" name="ZoneTexte 3"/>
+          <p:cNvSpPr txBox="1"/>
+          <p:nvPr/>
+        </p:nvSpPr>
+        <p:spPr>
+          <a:xfrm>
+            <a:off x="683568" y="1275606"/>
+            <a:ext cx="3960440" cy="2954655"/>
+          </a:xfrm>
+          <a:prstGeom prst="rect">
+            <a:avLst/>
+          </a:prstGeom>
+          <a:noFill/>
+        </p:spPr>
+        <p:txBody>
+          <a:bodyPr wrap="square" rtlCol="0">
+            <a:spAutoFit/>
+          </a:bodyPr>
+          <a:lstStyle/>
+          <a:p>
+            <a:pPr lvl="0"/>
+            <a:r>
+              <a:rPr lang="fr-FR" b="1" dirty="0">
+                <a:ln w="12700">
+                  <a:noFill/>
+                  <a:prstDash val="solid"/>
+                </a:ln>
+                <a:effectLst>
+                  <a:outerShdw blurRad="41275" dist="20320" dir="1800000" algn="tl" rotWithShape="0">
+                    <a:srgbClr val="000000">
+                      <a:alpha val="40000"/>
+                    </a:srgbClr>
+                  </a:outerShdw>
+                </a:effectLst>
+              </a:rPr>
+              <a:t>01 - Transmission de l'information</a:t>
+            </a:r>
+          </a:p>
+          <a:p>
+            <a:pPr lvl="0"/>
+            <a:r>
+              <a:rPr lang="fr-FR" b="1" dirty="0">
+                <a:ln w="12700">
+                  <a:noFill/>
+                  <a:prstDash val="solid"/>
+                </a:ln>
+                <a:effectLst>
+                  <a:outerShdw blurRad="41275" dist="20320" dir="1800000" algn="tl" rotWithShape="0">
+                    <a:srgbClr val="000000">
+                      <a:alpha val="40000"/>
+                    </a:srgbClr>
+                  </a:outerShdw>
+                </a:effectLst>
+              </a:rPr>
+              <a:t>02 - Le titre des pages</a:t>
+            </a:r>
+          </a:p>
+          <a:p>
+            <a:pPr lvl="0"/>
+            <a:r>
+              <a:rPr lang="fr-FR" b="1" dirty="0">
+                <a:ln w="12700">
+                  <a:noFill/>
+                  <a:prstDash val="solid"/>
+                </a:ln>
+                <a:effectLst>
+                  <a:outerShdw blurRad="41275" dist="20320" dir="1800000" algn="tl" rotWithShape="0">
+                    <a:srgbClr val="000000">
+                      <a:alpha val="40000"/>
+                    </a:srgbClr>
+                  </a:outerShdw>
+                </a:effectLst>
+              </a:rPr>
+              <a:t>03 - Les titres des rubriques</a:t>
+            </a:r>
+          </a:p>
+          <a:p>
+            <a:pPr lvl="0"/>
+            <a:r>
+              <a:rPr lang="fr-FR" b="1" dirty="0">
+                <a:ln w="12700">
+                  <a:noFill/>
+                  <a:prstDash val="solid"/>
+                </a:ln>
+                <a:effectLst>
+                  <a:outerShdw blurRad="41275" dist="20320" dir="1800000" algn="tl" rotWithShape="0">
+                    <a:srgbClr val="000000">
+                      <a:alpha val="40000"/>
+                    </a:srgbClr>
+                  </a:outerShdw>
+                </a:effectLst>
+              </a:rPr>
+              <a:t>04 - Les alternatives textuelles</a:t>
+            </a:r>
+          </a:p>
+          <a:p>
+            <a:pPr lvl="0"/>
+            <a:r>
+              <a:rPr lang="fr-FR" b="1" dirty="0">
+                <a:ln w="12700">
+                  <a:noFill/>
+                  <a:prstDash val="solid"/>
+                </a:ln>
+                <a:effectLst>
+                  <a:outerShdw blurRad="41275" dist="20320" dir="1800000" algn="tl" rotWithShape="0">
+                    <a:srgbClr val="000000">
+                      <a:alpha val="40000"/>
+                    </a:srgbClr>
+                  </a:outerShdw>
+                </a:effectLst>
+              </a:rPr>
+              <a:t>05 - La gestion des formulaires</a:t>
+            </a:r>
+          </a:p>
+          <a:p>
+            <a:pPr lvl="0"/>
+            <a:r>
+              <a:rPr lang="fr-FR" b="1" dirty="0">
+                <a:ln w="12700">
+                  <a:noFill/>
+                  <a:prstDash val="solid"/>
+                </a:ln>
+                <a:effectLst>
+                  <a:outerShdw blurRad="41275" dist="20320" dir="1800000" algn="tl" rotWithShape="0">
+                    <a:srgbClr val="000000">
+                      <a:alpha val="40000"/>
+                    </a:srgbClr>
+                  </a:outerShdw>
+                </a:effectLst>
+              </a:rPr>
+              <a:t>06 - La navigation au clavier</a:t>
+            </a:r>
+            <a:br>
+              <a:rPr lang="fr-FR" b="1" dirty="0">
+                <a:ln w="12700">
+                  <a:noFill/>
+                  <a:prstDash val="solid"/>
+                </a:ln>
+                <a:effectLst>
+                  <a:outerShdw blurRad="41275" dist="20320" dir="1800000" algn="tl" rotWithShape="0">
+                    <a:srgbClr val="000000">
+                      <a:alpha val="40000"/>
+                    </a:srgbClr>
+                  </a:outerShdw>
+                </a:effectLst>
+              </a:rPr>
+            </a:br>
+            <a:r>
+              <a:rPr lang="fr-FR" b="1" dirty="0">
+                <a:ln w="12700">
+                  <a:noFill/>
+                  <a:prstDash val="solid"/>
+                </a:ln>
+                <a:effectLst>
+                  <a:outerShdw blurRad="41275" dist="20320" dir="1800000" algn="tl" rotWithShape="0">
+                    <a:srgbClr val="000000">
+                      <a:alpha val="40000"/>
+                    </a:srgbClr>
+                  </a:outerShdw>
+                </a:effectLst>
+              </a:rPr>
+              <a:t>07 - La pertinence des liens</a:t>
+            </a:r>
+          </a:p>
+          <a:p>
+            <a:r>
+              <a:rPr lang="fr-FR" sz="1800" dirty="0">
+                <a:solidFill>
+                  <a:schemeClr val="bg2"/>
+                </a:solidFill>
+              </a:rPr>
+              <a:t>08 - La taille du texte et adaptation</a:t>
+            </a:r>
+          </a:p>
+          <a:p>
+            <a:pPr lvl="0"/>
+            <a:endParaRPr lang="fr-FR" b="1" dirty="0">
+              <a:ln w="12700">
+                <a:noFill/>
+                <a:prstDash val="solid"/>
+              </a:ln>
+              <a:effectLst>
+                <a:outerShdw blurRad="41275" dist="20320" dir="1800000" algn="tl" rotWithShape="0">
+                  <a:srgbClr val="000000">
+                    <a:alpha val="40000"/>
+                  </a:srgbClr>
+                </a:outerShdw>
+              </a:effectLst>
+            </a:endParaRPr>
+          </a:p>
+          <a:p>
+            <a:pPr lvl="0"/>
+            <a:r>
+              <a:rPr lang="fr-FR" b="1" dirty="0">
+                <a:ln w="12700">
+                  <a:noFill/>
+                  <a:prstDash val="solid"/>
+                </a:ln>
+                <a:effectLst>
+                  <a:outerShdw blurRad="41275" dist="20320" dir="1800000" algn="tl" rotWithShape="0">
+                    <a:srgbClr val="000000">
+                      <a:alpha val="40000"/>
+                    </a:srgbClr>
+                  </a:outerShdw>
+                </a:effectLst>
+              </a:rPr>
+              <a:t>08 - La taille du texte</a:t>
+            </a:r>
+          </a:p>
+          <a:p>
+            <a:pPr lvl="0"/>
+            <a:r>
+              <a:rPr lang="fr-FR" b="1" dirty="0">
+                <a:ln w="12700">
+                  <a:noFill/>
+                  <a:prstDash val="solid"/>
+                </a:ln>
+                <a:effectLst>
+                  <a:outerShdw blurRad="41275" dist="20320" dir="1800000" algn="tl" rotWithShape="0">
+                    <a:srgbClr val="000000">
+                      <a:alpha val="40000"/>
+                    </a:srgbClr>
+                  </a:outerShdw>
+                </a:effectLst>
+              </a:rPr>
+              <a:t>09 - Le contraste des couleurs</a:t>
+            </a:r>
+          </a:p>
+          <a:p>
+            <a:r>
+              <a:rPr lang="fr-FR" b="1" dirty="0">
+                <a:ln w="12700">
+                  <a:noFill/>
+                  <a:prstDash val="solid"/>
+                </a:ln>
+                <a:effectLst>
+                  <a:outerShdw blurRad="41275" dist="20320" dir="1800000" algn="tl" rotWithShape="0">
+                    <a:srgbClr val="000000">
+                      <a:alpha val="40000"/>
+                    </a:srgbClr>
+                  </a:outerShdw>
+                </a:effectLst>
+              </a:rPr>
+              <a:t>10 - Ouverture de nouvelle fenêtre</a:t>
+            </a:r>
+          </a:p>
+          <a:p>
+            <a:r>
+              <a:rPr lang="fr-FR" b="1" dirty="0">
+                <a:ln w="12700">
+                  <a:noFill/>
+                  <a:prstDash val="solid"/>
+                </a:ln>
+                <a:effectLst>
+                  <a:outerShdw blurRad="41275" dist="20320" dir="1800000" algn="tl" rotWithShape="0">
+                    <a:srgbClr val="000000">
+                      <a:alpha val="40000"/>
+                    </a:srgbClr>
+                  </a:outerShdw>
+                </a:effectLst>
+              </a:rPr>
+              <a:t>11 – Identifier les régions et regroupements</a:t>
+            </a:r>
+          </a:p>
+        </p:txBody>
+      </p:sp>
+    </p:spTree>
+    <p:extLst>
+      <p:ext uri="{BB962C8B-B14F-4D97-AF65-F5344CB8AC3E}">
+        <p14:creationId xmlns:p14="http://schemas.microsoft.com/office/powerpoint/2010/main" val="1091932680"/>
+      </p:ext>
+    </p:extLst>
+  </p:cSld>
+  <p:clrMapOvr>
+    <a:masterClrMapping/>
+  </p:clrMapOvr>
+  <p:transition spd="med">
+    <p:fade/>
+  </p:transition>
 </p:sld>
 </file>
 
@@ -25127,344 +25347,245 @@
             <p:ph idx="1"/>
           </p:nvPr>
         </p:nvSpPr>
-        <p:spPr/>
+        <p:spPr>
+          <a:noFill/>
+          <a:extLst>
+            <a:ext uri="{909E8E84-426E-40DD-AFC4-6F175D3DCCD1}">
+              <a14:hiddenFill xmlns:a14="http://schemas.microsoft.com/office/drawing/2010/main">
+                <a:solidFill>
+                  <a:srgbClr val="FFFFFF"/>
+                </a:solidFill>
+              </a14:hiddenFill>
+            </a:ext>
+          </a:extLst>
+        </p:spPr>
         <p:txBody>
           <a:bodyPr/>
           <a:lstStyle/>
           <a:p>
             <a:r>
-              <a:rPr lang="fr-FR" dirty="0"/>
-              <a:t>Quelques recommandations</a:t>
-            </a:r>
-          </a:p>
-        </p:txBody>
-      </p:sp>
-      <p:pic>
-        <p:nvPicPr>
-          <p:cNvPr id="3" name="Picture 4" descr="U155516_en"/>
-          <p:cNvPicPr>
-            <a:picLocks noChangeAspect="1" noChangeArrowheads="1"/>
-          </p:cNvPicPr>
-          <p:nvPr/>
-        </p:nvPicPr>
-        <p:blipFill>
-          <a:blip r:embed="rId2" cstate="print">
-            <a:extLst>
-              <a:ext uri="{28A0092B-C50C-407E-A947-70E740481C1C}">
-                <a14:useLocalDpi xmlns:a14="http://schemas.microsoft.com/office/drawing/2010/main" val="0"/>
-              </a:ext>
-            </a:extLst>
-          </a:blip>
-          <a:srcRect/>
-          <a:stretch>
-            <a:fillRect/>
-          </a:stretch>
-        </p:blipFill>
-        <p:spPr bwMode="auto">
-          <a:xfrm>
-            <a:off x="5436096" y="1275606"/>
-            <a:ext cx="2520280" cy="2000635"/>
-          </a:xfrm>
-          <a:prstGeom prst="rect">
-            <a:avLst/>
-          </a:prstGeom>
-          <a:noFill/>
-          <a:ln>
-            <a:noFill/>
-          </a:ln>
-          <a:extLst>
-            <a:ext uri="{909E8E84-426E-40DD-AFC4-6F175D3DCCD1}">
-              <a14:hiddenFill xmlns:a14="http://schemas.microsoft.com/office/drawing/2010/main">
-                <a:solidFill>
-                  <a:srgbClr val="FFFFFF"/>
-                </a:solidFill>
-              </a14:hiddenFill>
-            </a:ext>
-            <a:ext uri="{91240B29-F687-4F45-9708-019B960494DF}">
-              <a14:hiddenLine xmlns:a14="http://schemas.microsoft.com/office/drawing/2010/main" w="9525">
-                <a:solidFill>
-                  <a:srgbClr val="000000"/>
-                </a:solidFill>
-                <a:miter lim="800000"/>
-                <a:headEnd/>
-                <a:tailEnd/>
-              </a14:hiddenLine>
-            </a:ext>
-          </a:extLst>
-        </p:spPr>
-      </p:pic>
-      <p:sp>
-        <p:nvSpPr>
-          <p:cNvPr id="4" name="ZoneTexte 3"/>
-          <p:cNvSpPr txBox="1"/>
-          <p:nvPr/>
-        </p:nvSpPr>
-        <p:spPr>
-          <a:xfrm>
-            <a:off x="683568" y="1275606"/>
-            <a:ext cx="3960440" cy="2954655"/>
-          </a:xfrm>
-          <a:prstGeom prst="rect">
-            <a:avLst/>
-          </a:prstGeom>
-          <a:noFill/>
-        </p:spPr>
-        <p:txBody>
-          <a:bodyPr wrap="square" rtlCol="0">
-            <a:spAutoFit/>
-          </a:bodyPr>
-          <a:lstStyle/>
-          <a:p>
-            <a:pPr lvl="0"/>
-            <a:r>
-              <a:rPr lang="fr-FR" b="1" dirty="0">
-                <a:ln w="12700">
-                  <a:noFill/>
-                  <a:prstDash val="solid"/>
-                </a:ln>
-                <a:effectLst>
-                  <a:outerShdw blurRad="41275" dist="20320" dir="1800000" algn="tl" rotWithShape="0">
-                    <a:srgbClr val="000000">
-                      <a:alpha val="40000"/>
-                    </a:srgbClr>
-                  </a:outerShdw>
-                </a:effectLst>
-              </a:rPr>
-              <a:t>01 - Transmission de l'information</a:t>
-            </a:r>
-          </a:p>
-          <a:p>
-            <a:pPr lvl="0"/>
-            <a:r>
-              <a:rPr lang="fr-FR" b="1" dirty="0">
-                <a:ln w="12700">
-                  <a:noFill/>
-                  <a:prstDash val="solid"/>
-                </a:ln>
-                <a:effectLst>
-                  <a:outerShdw blurRad="41275" dist="20320" dir="1800000" algn="tl" rotWithShape="0">
-                    <a:srgbClr val="000000">
-                      <a:alpha val="40000"/>
-                    </a:srgbClr>
-                  </a:outerShdw>
-                </a:effectLst>
-              </a:rPr>
-              <a:t>02 - Le titre des pages</a:t>
-            </a:r>
-          </a:p>
-          <a:p>
-            <a:pPr lvl="0"/>
-            <a:r>
-              <a:rPr lang="fr-FR" b="1" dirty="0">
-                <a:ln w="12700">
-                  <a:noFill/>
-                  <a:prstDash val="solid"/>
-                </a:ln>
-                <a:effectLst>
-                  <a:outerShdw blurRad="41275" dist="20320" dir="1800000" algn="tl" rotWithShape="0">
-                    <a:srgbClr val="000000">
-                      <a:alpha val="40000"/>
-                    </a:srgbClr>
-                  </a:outerShdw>
-                </a:effectLst>
-              </a:rPr>
-              <a:t>03 - Les titres des rubriques</a:t>
-            </a:r>
-          </a:p>
-          <a:p>
-            <a:pPr lvl="0"/>
-            <a:r>
-              <a:rPr lang="fr-FR" b="1" dirty="0">
-                <a:ln w="12700">
-                  <a:noFill/>
-                  <a:prstDash val="solid"/>
-                </a:ln>
-                <a:effectLst>
-                  <a:outerShdw blurRad="41275" dist="20320" dir="1800000" algn="tl" rotWithShape="0">
-                    <a:srgbClr val="000000">
-                      <a:alpha val="40000"/>
-                    </a:srgbClr>
-                  </a:outerShdw>
-                </a:effectLst>
-              </a:rPr>
-              <a:t>04 - Les alternatives textuelles</a:t>
-            </a:r>
-          </a:p>
-          <a:p>
-            <a:pPr lvl="0"/>
-            <a:r>
-              <a:rPr lang="fr-FR" b="1" dirty="0">
-                <a:ln w="12700">
-                  <a:noFill/>
-                  <a:prstDash val="solid"/>
-                </a:ln>
-                <a:effectLst>
-                  <a:outerShdw blurRad="41275" dist="20320" dir="1800000" algn="tl" rotWithShape="0">
-                    <a:srgbClr val="000000">
-                      <a:alpha val="40000"/>
-                    </a:srgbClr>
-                  </a:outerShdw>
-                </a:effectLst>
-              </a:rPr>
-              <a:t>05 - La gestion des formulaires</a:t>
-            </a:r>
-          </a:p>
-          <a:p>
-            <a:pPr lvl="0"/>
-            <a:r>
-              <a:rPr lang="fr-FR" b="1" dirty="0">
-                <a:ln w="12700">
-                  <a:noFill/>
-                  <a:prstDash val="solid"/>
-                </a:ln>
-                <a:effectLst>
-                  <a:outerShdw blurRad="41275" dist="20320" dir="1800000" algn="tl" rotWithShape="0">
-                    <a:srgbClr val="000000">
-                      <a:alpha val="40000"/>
-                    </a:srgbClr>
-                  </a:outerShdw>
-                </a:effectLst>
-              </a:rPr>
-              <a:t>06 - La navigation au clavier</a:t>
-            </a:r>
-            <a:br>
-              <a:rPr lang="fr-FR" b="1" dirty="0">
-                <a:ln w="12700">
-                  <a:noFill/>
-                  <a:prstDash val="solid"/>
-                </a:ln>
-                <a:effectLst>
-                  <a:outerShdw blurRad="41275" dist="20320" dir="1800000" algn="tl" rotWithShape="0">
-                    <a:srgbClr val="000000">
-                      <a:alpha val="40000"/>
-                    </a:srgbClr>
-                  </a:outerShdw>
-                </a:effectLst>
-              </a:rPr>
-            </a:br>
-            <a:r>
-              <a:rPr lang="fr-FR" b="1" dirty="0">
-                <a:ln w="12700">
-                  <a:noFill/>
-                  <a:prstDash val="solid"/>
-                </a:ln>
-                <a:effectLst>
-                  <a:outerShdw blurRad="41275" dist="20320" dir="1800000" algn="tl" rotWithShape="0">
-                    <a:srgbClr val="000000">
-                      <a:alpha val="40000"/>
-                    </a:srgbClr>
-                  </a:outerShdw>
-                </a:effectLst>
-              </a:rPr>
-              <a:t>07 - La pertinence des liens</a:t>
-            </a:r>
-          </a:p>
-          <a:p>
-            <a:r>
-              <a:rPr lang="fr-FR" sz="1800" dirty="0">
-                <a:solidFill>
-                  <a:schemeClr val="bg2"/>
-                </a:solidFill>
-              </a:rPr>
-              <a:t>08 - La taille du texte et adaptation</a:t>
-            </a:r>
-          </a:p>
-          <a:p>
-            <a:pPr lvl="0"/>
-            <a:endParaRPr lang="fr-FR" b="1" dirty="0">
-              <a:ln w="12700">
-                <a:noFill/>
-                <a:prstDash val="solid"/>
-              </a:ln>
-              <a:effectLst>
-                <a:outerShdw blurRad="41275" dist="20320" dir="1800000" algn="tl" rotWithShape="0">
-                  <a:srgbClr val="000000">
-                    <a:alpha val="40000"/>
-                  </a:srgbClr>
-                </a:outerShdw>
-              </a:effectLst>
+              <a:rPr lang="fr-FR" sz="2000" dirty="0"/>
+              <a:t>Permettre le grossissement des textes</a:t>
+            </a:r>
+          </a:p>
+          <a:p>
+            <a:endParaRPr lang="fr-FR" sz="2000" dirty="0"/>
+          </a:p>
+          <a:p>
+            <a:endParaRPr lang="fr-FR" sz="2000" dirty="0"/>
+          </a:p>
+          <a:p>
+            <a:pPr>
+              <a:lnSpc>
+                <a:spcPct val="100000"/>
+              </a:lnSpc>
+            </a:pPr>
+            <a:r>
+              <a:rPr lang="fr-FR" sz="1400" dirty="0">
+                <a:solidFill>
+                  <a:schemeClr val="tx1"/>
+                </a:solidFill>
+              </a:rPr>
+              <a:t>Description : </a:t>
+            </a:r>
+          </a:p>
+          <a:p>
+            <a:r>
+              <a:rPr lang="fr-FR" sz="1400" dirty="0">
+                <a:solidFill>
+                  <a:schemeClr val="tx1"/>
+                </a:solidFill>
+                <a:latin typeface="Arial" panose="020B0604020202020204" pitchFamily="34" charset="0"/>
+                <a:cs typeface="Arial" panose="020B0604020202020204" pitchFamily="34" charset="0"/>
+              </a:rPr>
+              <a:t>Le document doit rester lisible, sans perte d’information ou de fonctionnalité avec </a:t>
+            </a:r>
+            <a:r>
+              <a:rPr lang="fr-FR" sz="1400" b="1" dirty="0">
+                <a:solidFill>
+                  <a:schemeClr val="tx1"/>
+                </a:solidFill>
+                <a:latin typeface="Arial" panose="020B0604020202020204" pitchFamily="34" charset="0"/>
+                <a:cs typeface="Arial" panose="020B0604020202020204" pitchFamily="34" charset="0"/>
+              </a:rPr>
+              <a:t>un zoom du texte</a:t>
+            </a:r>
+            <a:r>
+              <a:rPr lang="fr-FR" sz="1400" dirty="0">
+                <a:solidFill>
+                  <a:schemeClr val="tx1"/>
+                </a:solidFill>
+                <a:latin typeface="Arial" panose="020B0604020202020204" pitchFamily="34" charset="0"/>
+                <a:cs typeface="Arial" panose="020B0604020202020204" pitchFamily="34" charset="0"/>
+              </a:rPr>
+              <a:t> à 200%.</a:t>
+            </a:r>
+          </a:p>
+          <a:p>
+            <a:endParaRPr lang="fr-FR" sz="1400" dirty="0">
+              <a:solidFill>
+                <a:schemeClr val="tx1"/>
+              </a:solidFill>
+              <a:latin typeface="Arial" panose="020B0604020202020204" pitchFamily="34" charset="0"/>
+              <a:cs typeface="Arial" panose="020B0604020202020204" pitchFamily="34" charset="0"/>
             </a:endParaRPr>
           </a:p>
           <a:p>
-            <a:pPr lvl="0"/>
-            <a:r>
-              <a:rPr lang="fr-FR" b="1" dirty="0">
-                <a:ln w="12700">
-                  <a:noFill/>
-                  <a:prstDash val="solid"/>
-                </a:ln>
-                <a:effectLst>
-                  <a:outerShdw blurRad="41275" dist="20320" dir="1800000" algn="tl" rotWithShape="0">
-                    <a:srgbClr val="000000">
-                      <a:alpha val="40000"/>
-                    </a:srgbClr>
-                  </a:outerShdw>
-                </a:effectLst>
-              </a:rPr>
-              <a:t>08 - La taille du texte</a:t>
-            </a:r>
-          </a:p>
-          <a:p>
-            <a:pPr lvl="0"/>
-            <a:r>
-              <a:rPr lang="fr-FR" b="1" dirty="0">
-                <a:ln w="12700">
-                  <a:noFill/>
-                  <a:prstDash val="solid"/>
-                </a:ln>
-                <a:effectLst>
-                  <a:outerShdw blurRad="41275" dist="20320" dir="1800000" algn="tl" rotWithShape="0">
-                    <a:srgbClr val="000000">
-                      <a:alpha val="40000"/>
-                    </a:srgbClr>
-                  </a:outerShdw>
-                </a:effectLst>
-              </a:rPr>
-              <a:t>09 - Le contraste des couleurs</a:t>
-            </a:r>
-          </a:p>
-          <a:p>
-            <a:r>
-              <a:rPr lang="fr-FR" b="1" dirty="0">
-                <a:ln w="12700">
-                  <a:noFill/>
-                  <a:prstDash val="solid"/>
-                </a:ln>
-                <a:effectLst>
-                  <a:outerShdw blurRad="41275" dist="20320" dir="1800000" algn="tl" rotWithShape="0">
-                    <a:srgbClr val="000000">
-                      <a:alpha val="40000"/>
-                    </a:srgbClr>
-                  </a:outerShdw>
-                </a:effectLst>
-              </a:rPr>
-              <a:t>10 - Ouverture de nouvelle fenêtre</a:t>
-            </a:r>
-          </a:p>
-          <a:p>
-            <a:r>
-              <a:rPr lang="fr-FR" b="1" dirty="0">
-                <a:ln w="12700">
-                  <a:noFill/>
-                  <a:prstDash val="solid"/>
-                </a:ln>
-                <a:effectLst>
-                  <a:outerShdw blurRad="41275" dist="20320" dir="1800000" algn="tl" rotWithShape="0">
-                    <a:srgbClr val="000000">
-                      <a:alpha val="40000"/>
-                    </a:srgbClr>
-                  </a:outerShdw>
-                </a:effectLst>
-              </a:rPr>
-              <a:t>11 – Identifier les régions et regroupements</a:t>
-            </a:r>
+            <a:r>
+              <a:rPr lang="fr-FR" sz="1400" dirty="0">
+                <a:solidFill>
+                  <a:schemeClr val="tx1"/>
+                </a:solidFill>
+                <a:latin typeface="Arial" panose="020B0604020202020204" pitchFamily="34" charset="0"/>
+                <a:cs typeface="Arial" panose="020B0604020202020204" pitchFamily="34" charset="0"/>
+              </a:rPr>
+              <a:t>Il faut également s'assurer de faire du contenu web adaptatif (responsive web design) donc prévoir les différents affichages selon des largeurs type d'écran (points de rupture) en amont du développement.</a:t>
+            </a:r>
+          </a:p>
+          <a:p>
+            <a:endParaRPr lang="fr-FR" sz="1400" dirty="0">
+              <a:solidFill>
+                <a:schemeClr val="tx1"/>
+              </a:solidFill>
+              <a:latin typeface="Arial" panose="020B0604020202020204" pitchFamily="34" charset="0"/>
+              <a:cs typeface="Arial" panose="020B0604020202020204" pitchFamily="34" charset="0"/>
+            </a:endParaRPr>
+          </a:p>
+          <a:p>
+            <a:r>
+              <a:rPr lang="fr-FR" sz="1400" dirty="0">
+                <a:solidFill>
+                  <a:schemeClr val="tx1"/>
+                </a:solidFill>
+                <a:latin typeface="Arial" panose="020B0604020202020204" pitchFamily="34" charset="0"/>
+                <a:cs typeface="Arial" panose="020B0604020202020204" pitchFamily="34" charset="0"/>
+              </a:rPr>
+              <a:t>Par ailleurs, certains choix de design peuvent ou non faciliter la mise en place de ce critère lors du développement, il est donc important d’y réfléchir dès le départ.</a:t>
+            </a:r>
+          </a:p>
+          <a:p>
+            <a:endParaRPr lang="fr-FR" sz="1400" dirty="0">
+              <a:solidFill>
+                <a:schemeClr val="tx1"/>
+              </a:solidFill>
+            </a:endParaRPr>
+          </a:p>
+          <a:p>
+            <a:pPr>
+              <a:lnSpc>
+                <a:spcPct val="100000"/>
+              </a:lnSpc>
+            </a:pPr>
+            <a:r>
+              <a:rPr lang="fr-FR" sz="1400" dirty="0">
+                <a:solidFill>
+                  <a:schemeClr val="tx1"/>
+                </a:solidFill>
+              </a:rPr>
+              <a:t>Pour qui : </a:t>
+            </a:r>
+          </a:p>
+          <a:p>
+            <a:pPr>
+              <a:lnSpc>
+                <a:spcPct val="100000"/>
+              </a:lnSpc>
+            </a:pPr>
+            <a:r>
+              <a:rPr lang="fr-FR" sz="1400" dirty="0">
+                <a:solidFill>
+                  <a:schemeClr val="tx1"/>
+                </a:solidFill>
+                <a:latin typeface="Arial" panose="020B0604020202020204" pitchFamily="34" charset="0"/>
+                <a:cs typeface="Arial" panose="020B0604020202020204" pitchFamily="34" charset="0"/>
+              </a:rPr>
+              <a:t>Pour tous et en particulier les personnes déficientes visuelles et les seniors.</a:t>
+            </a:r>
+          </a:p>
+          <a:p>
+            <a:pPr>
+              <a:lnSpc>
+                <a:spcPct val="100000"/>
+              </a:lnSpc>
+            </a:pPr>
+            <a:endParaRPr lang="fr-FR" sz="1400" dirty="0">
+              <a:solidFill>
+                <a:schemeClr val="tx1"/>
+              </a:solidFill>
+              <a:latin typeface="Arial" panose="020B0604020202020204" pitchFamily="34" charset="0"/>
+              <a:cs typeface="Arial" panose="020B0604020202020204" pitchFamily="34" charset="0"/>
+            </a:endParaRPr>
+          </a:p>
+          <a:p>
+            <a:pPr>
+              <a:lnSpc>
+                <a:spcPct val="100000"/>
+              </a:lnSpc>
+            </a:pPr>
+            <a:r>
+              <a:rPr lang="fr-FR" sz="1400" dirty="0">
+                <a:solidFill>
+                  <a:schemeClr val="tx1"/>
+                </a:solidFill>
+              </a:rPr>
+              <a:t>Quand : </a:t>
+            </a:r>
+          </a:p>
+          <a:p>
+            <a:pPr>
+              <a:lnSpc>
+                <a:spcPct val="100000"/>
+              </a:lnSpc>
+            </a:pPr>
+            <a:r>
+              <a:rPr lang="fr-FR" sz="1400" dirty="0">
+                <a:solidFill>
+                  <a:schemeClr val="tx1"/>
+                </a:solidFill>
+                <a:latin typeface="Arial" panose="020B0604020202020204" pitchFamily="34" charset="0"/>
+                <a:cs typeface="Arial" panose="020B0604020202020204" pitchFamily="34" charset="0"/>
+              </a:rPr>
+              <a:t>Pendant la conception et le développement</a:t>
+            </a:r>
+          </a:p>
+          <a:p>
+            <a:pPr>
+              <a:lnSpc>
+                <a:spcPct val="100000"/>
+              </a:lnSpc>
+            </a:pPr>
+            <a:endParaRPr lang="fr-FR" sz="1400" dirty="0">
+              <a:solidFill>
+                <a:schemeClr val="tx1"/>
+              </a:solidFill>
+              <a:latin typeface="Arial" panose="020B0604020202020204" pitchFamily="34" charset="0"/>
+              <a:cs typeface="Arial" panose="020B0604020202020204" pitchFamily="34" charset="0"/>
+            </a:endParaRPr>
+          </a:p>
+          <a:p>
+            <a:endParaRPr lang="fr-FR" sz="1400" dirty="0">
+              <a:solidFill>
+                <a:schemeClr val="tx1"/>
+              </a:solidFill>
+              <a:latin typeface="Arial" panose="020B0604020202020204" pitchFamily="34" charset="0"/>
+              <a:cs typeface="Arial" panose="020B0604020202020204" pitchFamily="34" charset="0"/>
+            </a:endParaRPr>
+          </a:p>
+          <a:p>
+            <a:endParaRPr lang="fr-FR" sz="1400" dirty="0">
+              <a:solidFill>
+                <a:schemeClr val="tx1"/>
+              </a:solidFill>
+              <a:latin typeface="Arial" panose="020B0604020202020204" pitchFamily="34" charset="0"/>
+              <a:cs typeface="Arial" panose="020B0604020202020204" pitchFamily="34" charset="0"/>
+            </a:endParaRPr>
           </a:p>
         </p:txBody>
       </p:sp>
     </p:spTree>
     <p:extLst>
       <p:ext uri="{BB962C8B-B14F-4D97-AF65-F5344CB8AC3E}">
-        <p14:creationId xmlns:p14="http://schemas.microsoft.com/office/powerpoint/2010/main" val="1091932680"/>
+        <p14:creationId xmlns:p14="http://schemas.microsoft.com/office/powerpoint/2010/main" val="1753807344"/>
       </p:ext>
     </p:extLst>
   </p:cSld>
@@ -25505,284 +25626,6 @@
           </p:nvPr>
         </p:nvSpPr>
         <p:spPr>
-          <a:noFill/>
-          <a:extLst>
-            <a:ext uri="{909E8E84-426E-40DD-AFC4-6F175D3DCCD1}">
-              <a14:hiddenFill xmlns:a14="http://schemas.microsoft.com/office/drawing/2010/main">
-                <a:solidFill>
-                  <a:srgbClr val="FFFFFF"/>
-                </a:solidFill>
-              </a14:hiddenFill>
-            </a:ext>
-          </a:extLst>
-        </p:spPr>
-        <p:txBody>
-          <a:bodyPr/>
-          <a:lstStyle/>
-          <a:p>
-            <a:r>
-              <a:rPr lang="fr-FR" sz="2000" dirty="0"/>
-              <a:t>Permettre le grossissement des textes</a:t>
-            </a:r>
-          </a:p>
-          <a:p>
-            <a:endParaRPr lang="fr-FR" sz="2000" dirty="0"/>
-          </a:p>
-          <a:p>
-            <a:endParaRPr lang="fr-FR" sz="2000" dirty="0"/>
-          </a:p>
-          <a:p>
-            <a:pPr>
-              <a:lnSpc>
-                <a:spcPct val="100000"/>
-              </a:lnSpc>
-            </a:pPr>
-            <a:r>
-              <a:rPr lang="fr-FR" sz="1400" dirty="0">
-                <a:solidFill>
-                  <a:schemeClr val="tx1"/>
-                </a:solidFill>
-              </a:rPr>
-              <a:t>Description : </a:t>
-            </a:r>
-          </a:p>
-          <a:p>
-            <a:r>
-              <a:rPr lang="fr-FR" sz="1400" dirty="0">
-                <a:solidFill>
-                  <a:schemeClr val="tx1"/>
-                </a:solidFill>
-                <a:latin typeface="Arial" panose="020B0604020202020204" pitchFamily="34" charset="0"/>
-                <a:cs typeface="Arial" panose="020B0604020202020204" pitchFamily="34" charset="0"/>
-              </a:rPr>
-              <a:t>Le document doit rester lisible, sans perte d’information ou de fonctionnalité avec </a:t>
-            </a:r>
-            <a:r>
-              <a:rPr lang="fr-FR" sz="1400" b="1" dirty="0">
-                <a:solidFill>
-                  <a:schemeClr val="tx1"/>
-                </a:solidFill>
-                <a:latin typeface="Arial" panose="020B0604020202020204" pitchFamily="34" charset="0"/>
-                <a:cs typeface="Arial" panose="020B0604020202020204" pitchFamily="34" charset="0"/>
-              </a:rPr>
-              <a:t>un zoom du texte</a:t>
-            </a:r>
-            <a:r>
-              <a:rPr lang="fr-FR" sz="1400" dirty="0">
-                <a:solidFill>
-                  <a:schemeClr val="tx1"/>
-                </a:solidFill>
-                <a:latin typeface="Arial" panose="020B0604020202020204" pitchFamily="34" charset="0"/>
-                <a:cs typeface="Arial" panose="020B0604020202020204" pitchFamily="34" charset="0"/>
-              </a:rPr>
-              <a:t> à 200%.</a:t>
-            </a:r>
-          </a:p>
-          <a:p>
-            <a:endParaRPr lang="fr-FR" sz="1400" dirty="0">
-              <a:solidFill>
-                <a:schemeClr val="tx1"/>
-              </a:solidFill>
-              <a:latin typeface="Arial" panose="020B0604020202020204" pitchFamily="34" charset="0"/>
-              <a:cs typeface="Arial" panose="020B0604020202020204" pitchFamily="34" charset="0"/>
-            </a:endParaRPr>
-          </a:p>
-          <a:p>
-            <a:r>
-              <a:rPr lang="fr-FR" sz="1400" dirty="0">
-                <a:solidFill>
-                  <a:schemeClr val="tx1"/>
-                </a:solidFill>
-                <a:latin typeface="Arial" panose="020B0604020202020204" pitchFamily="34" charset="0"/>
-                <a:cs typeface="Arial" panose="020B0604020202020204" pitchFamily="34" charset="0"/>
-              </a:rPr>
-              <a:t>Il faut également s'assurer de faire du contenu web adaptatif (responsive web design) donc prévoir les différents affichages selon des largeurs type d'écran (points de rupture) en amont du développement.</a:t>
-            </a:r>
-          </a:p>
-          <a:p>
-            <a:endParaRPr lang="fr-FR" sz="1400" dirty="0">
-              <a:solidFill>
-                <a:schemeClr val="tx1"/>
-              </a:solidFill>
-              <a:latin typeface="Arial" panose="020B0604020202020204" pitchFamily="34" charset="0"/>
-              <a:cs typeface="Arial" panose="020B0604020202020204" pitchFamily="34" charset="0"/>
-            </a:endParaRPr>
-          </a:p>
-          <a:p>
-            <a:r>
-              <a:rPr lang="fr-FR" sz="1400" dirty="0">
-                <a:solidFill>
-                  <a:schemeClr val="tx1"/>
-                </a:solidFill>
-                <a:latin typeface="Arial" panose="020B0604020202020204" pitchFamily="34" charset="0"/>
-                <a:cs typeface="Arial" panose="020B0604020202020204" pitchFamily="34" charset="0"/>
-              </a:rPr>
-              <a:t>Par ailleurs, certains choix de design peuvent ou non faciliter la mise en place de ce critère lors du développement, il est donc important d’y réfléchir dès le départ.</a:t>
-            </a:r>
-          </a:p>
-          <a:p>
-            <a:endParaRPr lang="fr-FR" sz="1400" dirty="0">
-              <a:solidFill>
-                <a:schemeClr val="tx1"/>
-              </a:solidFill>
-            </a:endParaRPr>
-          </a:p>
-          <a:p>
-            <a:pPr>
-              <a:lnSpc>
-                <a:spcPct val="100000"/>
-              </a:lnSpc>
-            </a:pPr>
-            <a:r>
-              <a:rPr lang="fr-FR" sz="1400" dirty="0">
-                <a:solidFill>
-                  <a:schemeClr val="tx1"/>
-                </a:solidFill>
-              </a:rPr>
-              <a:t>Pour qui : </a:t>
-            </a:r>
-          </a:p>
-          <a:p>
-            <a:pPr>
-              <a:lnSpc>
-                <a:spcPct val="100000"/>
-              </a:lnSpc>
-            </a:pPr>
-            <a:r>
-              <a:rPr lang="fr-FR" sz="1400" dirty="0">
-                <a:solidFill>
-                  <a:schemeClr val="tx1"/>
-                </a:solidFill>
-                <a:latin typeface="Arial" panose="020B0604020202020204" pitchFamily="34" charset="0"/>
-                <a:cs typeface="Arial" panose="020B0604020202020204" pitchFamily="34" charset="0"/>
-              </a:rPr>
-              <a:t>Pour tous et en particulier les personnes déficientes visuelles et les seniors.</a:t>
-            </a:r>
-          </a:p>
-          <a:p>
-            <a:pPr>
-              <a:lnSpc>
-                <a:spcPct val="100000"/>
-              </a:lnSpc>
-            </a:pPr>
-            <a:endParaRPr lang="fr-FR" sz="1400" dirty="0">
-              <a:solidFill>
-                <a:schemeClr val="tx1"/>
-              </a:solidFill>
-              <a:latin typeface="Arial" panose="020B0604020202020204" pitchFamily="34" charset="0"/>
-              <a:cs typeface="Arial" panose="020B0604020202020204" pitchFamily="34" charset="0"/>
-            </a:endParaRPr>
-          </a:p>
-          <a:p>
-            <a:pPr>
-              <a:lnSpc>
-                <a:spcPct val="100000"/>
-              </a:lnSpc>
-            </a:pPr>
-            <a:r>
-              <a:rPr lang="fr-FR" sz="1400" dirty="0">
-                <a:solidFill>
-                  <a:schemeClr val="tx1"/>
-                </a:solidFill>
-              </a:rPr>
-              <a:t>Quand : </a:t>
-            </a:r>
-          </a:p>
-          <a:p>
-            <a:pPr>
-              <a:lnSpc>
-                <a:spcPct val="100000"/>
-              </a:lnSpc>
-            </a:pPr>
-            <a:r>
-              <a:rPr lang="fr-FR" sz="1400" dirty="0">
-                <a:solidFill>
-                  <a:schemeClr val="tx1"/>
-                </a:solidFill>
-                <a:latin typeface="Arial" panose="020B0604020202020204" pitchFamily="34" charset="0"/>
-                <a:cs typeface="Arial" panose="020B0604020202020204" pitchFamily="34" charset="0"/>
-              </a:rPr>
-              <a:t>Pendant la conception et le développement</a:t>
-            </a:r>
-          </a:p>
-          <a:p>
-            <a:pPr>
-              <a:lnSpc>
-                <a:spcPct val="100000"/>
-              </a:lnSpc>
-            </a:pPr>
-            <a:endParaRPr lang="fr-FR" sz="1400" dirty="0">
-              <a:solidFill>
-                <a:schemeClr val="tx1"/>
-              </a:solidFill>
-              <a:latin typeface="Arial" panose="020B0604020202020204" pitchFamily="34" charset="0"/>
-              <a:cs typeface="Arial" panose="020B0604020202020204" pitchFamily="34" charset="0"/>
-            </a:endParaRPr>
-          </a:p>
-          <a:p>
-            <a:endParaRPr lang="fr-FR" sz="1400" dirty="0">
-              <a:solidFill>
-                <a:schemeClr val="tx1"/>
-              </a:solidFill>
-              <a:latin typeface="Arial" panose="020B0604020202020204" pitchFamily="34" charset="0"/>
-              <a:cs typeface="Arial" panose="020B0604020202020204" pitchFamily="34" charset="0"/>
-            </a:endParaRPr>
-          </a:p>
-          <a:p>
-            <a:endParaRPr lang="fr-FR" sz="1400" dirty="0">
-              <a:solidFill>
-                <a:schemeClr val="tx1"/>
-              </a:solidFill>
-              <a:latin typeface="Arial" panose="020B0604020202020204" pitchFamily="34" charset="0"/>
-              <a:cs typeface="Arial" panose="020B0604020202020204" pitchFamily="34" charset="0"/>
-            </a:endParaRPr>
-          </a:p>
-        </p:txBody>
-      </p:sp>
-    </p:spTree>
-    <p:extLst>
-      <p:ext uri="{BB962C8B-B14F-4D97-AF65-F5344CB8AC3E}">
-        <p14:creationId xmlns:p14="http://schemas.microsoft.com/office/powerpoint/2010/main" val="1753807344"/>
-      </p:ext>
-    </p:extLst>
-  </p:cSld>
-  <p:clrMapOvr>
-    <a:masterClrMapping/>
-  </p:clrMapOvr>
-  <p:transition spd="med">
-    <p:fade/>
-  </p:transition>
-</p:sld>
-</file>
-
-<file path=ppt/slides/slide42.xml><?xml version="1.0" encoding="utf-8"?>
-<p:sld xmlns:a="http://schemas.openxmlformats.org/drawingml/2006/main" xmlns:r="http://schemas.openxmlformats.org/officeDocument/2006/relationships" xmlns:p="http://schemas.openxmlformats.org/presentationml/2006/main">
-  <p:cSld>
-    <p:spTree>
-      <p:nvGrpSpPr>
-        <p:cNvPr id="1" name=""/>
-        <p:cNvGrpSpPr/>
-        <p:nvPr/>
-      </p:nvGrpSpPr>
-      <p:grpSpPr>
-        <a:xfrm>
-          <a:off x="0" y="0"/>
-          <a:ext cx="0" cy="0"/>
-          <a:chOff x="0" y="0"/>
-          <a:chExt cx="0" cy="0"/>
-        </a:xfrm>
-      </p:grpSpPr>
-      <p:sp>
-        <p:nvSpPr>
-          <p:cNvPr id="2" name="Espace réservé du contenu 1"/>
-          <p:cNvSpPr>
-            <a:spLocks noGrp="1"/>
-          </p:cNvSpPr>
-          <p:nvPr>
-            <p:ph idx="1"/>
-          </p:nvPr>
-        </p:nvSpPr>
-        <p:spPr>
           <a:xfrm>
             <a:off x="339726" y="339725"/>
             <a:ext cx="8470899" cy="575841"/>
@@ -25898,7 +25741,7 @@
 </p:sld>
 </file>
 
-<file path=ppt/slides/slide43.xml><?xml version="1.0" encoding="utf-8"?>
+<file path=ppt/slides/slide42.xml><?xml version="1.0" encoding="utf-8"?>
 <p:sld xmlns:a="http://schemas.openxmlformats.org/drawingml/2006/main" xmlns:r="http://schemas.openxmlformats.org/officeDocument/2006/relationships" xmlns:p="http://schemas.openxmlformats.org/presentationml/2006/main">
   <p:cSld>
     <p:spTree>
@@ -26428,7 +26271,7 @@
 </p:sld>
 </file>
 
-<file path=ppt/slides/slide44.xml><?xml version="1.0" encoding="utf-8"?>
+<file path=ppt/slides/slide43.xml><?xml version="1.0" encoding="utf-8"?>
 <p:sld xmlns:a="http://schemas.openxmlformats.org/drawingml/2006/main" xmlns:r="http://schemas.openxmlformats.org/officeDocument/2006/relationships" xmlns:p="http://schemas.openxmlformats.org/presentationml/2006/main">
   <p:cSld>
     <p:spTree>
@@ -27068,7 +26911,7 @@
 </p:sld>
 </file>
 
-<file path=ppt/slides/slide45.xml><?xml version="1.0" encoding="utf-8"?>
+<file path=ppt/slides/slide44.xml><?xml version="1.0" encoding="utf-8"?>
 <p:sld xmlns:a="http://schemas.openxmlformats.org/drawingml/2006/main" xmlns:r="http://schemas.openxmlformats.org/officeDocument/2006/relationships" xmlns:p="http://schemas.openxmlformats.org/presentationml/2006/main">
   <p:cSld>
     <p:spTree>
@@ -27221,7 +27064,7 @@
 </p:sld>
 </file>
 
-<file path=ppt/slides/slide46.xml><?xml version="1.0" encoding="utf-8"?>
+<file path=ppt/slides/slide45.xml><?xml version="1.0" encoding="utf-8"?>
 <p:sld xmlns:a="http://schemas.openxmlformats.org/drawingml/2006/main" xmlns:r="http://schemas.openxmlformats.org/officeDocument/2006/relationships" xmlns:p="http://schemas.openxmlformats.org/presentationml/2006/main">
   <p:cSld>
     <p:spTree>
@@ -27668,7 +27511,7 @@
 </p:sld>
 </file>
 
-<file path=ppt/slides/slide47.xml><?xml version="1.0" encoding="utf-8"?>
+<file path=ppt/slides/slide46.xml><?xml version="1.0" encoding="utf-8"?>
 <p:sld xmlns:a="http://schemas.openxmlformats.org/drawingml/2006/main" xmlns:r="http://schemas.openxmlformats.org/officeDocument/2006/relationships" xmlns:p="http://schemas.openxmlformats.org/presentationml/2006/main">
   <p:cSld>
     <p:spTree>
@@ -28046,7 +27889,7 @@
 </p:sld>
 </file>
 
-<file path=ppt/slides/slide48.xml><?xml version="1.0" encoding="utf-8"?>
+<file path=ppt/slides/slide47.xml><?xml version="1.0" encoding="utf-8"?>
 <p:sld xmlns:a="http://schemas.openxmlformats.org/drawingml/2006/main" xmlns:r="http://schemas.openxmlformats.org/officeDocument/2006/relationships" xmlns:p="http://schemas.openxmlformats.org/presentationml/2006/main">
   <p:cSld>
     <p:spTree>
@@ -28525,7 +28368,7 @@
 </p:sld>
 </file>
 
-<file path=ppt/slides/slide49.xml><?xml version="1.0" encoding="utf-8"?>
+<file path=ppt/slides/slide48.xml><?xml version="1.0" encoding="utf-8"?>
 <p:sld xmlns:a="http://schemas.openxmlformats.org/drawingml/2006/main" xmlns:r="http://schemas.openxmlformats.org/officeDocument/2006/relationships" xmlns:p="http://schemas.openxmlformats.org/presentationml/2006/main">
   <p:cSld>
     <p:spTree>
@@ -28789,190 +28632,7 @@
 </p:sld>
 </file>
 
-<file path=ppt/slides/slide5.xml><?xml version="1.0" encoding="utf-8"?>
-<p:sld xmlns:a="http://schemas.openxmlformats.org/drawingml/2006/main" xmlns:r="http://schemas.openxmlformats.org/officeDocument/2006/relationships" xmlns:p="http://schemas.openxmlformats.org/presentationml/2006/main">
-  <p:cSld>
-    <p:spTree>
-      <p:nvGrpSpPr>
-        <p:cNvPr id="1" name=""/>
-        <p:cNvGrpSpPr/>
-        <p:nvPr/>
-      </p:nvGrpSpPr>
-      <p:grpSpPr>
-        <a:xfrm>
-          <a:off x="0" y="0"/>
-          <a:ext cx="0" cy="0"/>
-          <a:chOff x="0" y="0"/>
-          <a:chExt cx="0" cy="0"/>
-        </a:xfrm>
-      </p:grpSpPr>
-      <p:pic>
-        <p:nvPicPr>
-          <p:cNvPr id="8" name="Picture 4"/>
-          <p:cNvPicPr>
-            <a:picLocks noChangeAspect="1" noChangeArrowheads="1"/>
-          </p:cNvPicPr>
-          <p:nvPr/>
-        </p:nvPicPr>
-        <p:blipFill>
-          <a:blip r:embed="rId2">
-            <a:extLst>
-              <a:ext uri="{28A0092B-C50C-407E-A947-70E740481C1C}">
-                <a14:useLocalDpi xmlns:a14="http://schemas.microsoft.com/office/drawing/2010/main" val="0"/>
-              </a:ext>
-            </a:extLst>
-          </a:blip>
-          <a:srcRect/>
-          <a:stretch>
-            <a:fillRect/>
-          </a:stretch>
-        </p:blipFill>
-        <p:spPr bwMode="auto">
-          <a:xfrm>
-            <a:off x="3653304" y="1203598"/>
-            <a:ext cx="1783114" cy="2814311"/>
-          </a:xfrm>
-          <a:prstGeom prst="rect">
-            <a:avLst/>
-          </a:prstGeom>
-          <a:noFill/>
-          <a:ln>
-            <a:noFill/>
-          </a:ln>
-          <a:extLst>
-            <a:ext uri="{909E8E84-426E-40DD-AFC4-6F175D3DCCD1}">
-              <a14:hiddenFill xmlns:a14="http://schemas.microsoft.com/office/drawing/2010/main">
-                <a:solidFill>
-                  <a:srgbClr val="FFFFFF"/>
-                </a:solidFill>
-              </a14:hiddenFill>
-            </a:ext>
-            <a:ext uri="{91240B29-F687-4F45-9708-019B960494DF}">
-              <a14:hiddenLine xmlns:a14="http://schemas.microsoft.com/office/drawing/2010/main" w="9525">
-                <a:solidFill>
-                  <a:srgbClr val="000000"/>
-                </a:solidFill>
-                <a:miter lim="800000"/>
-                <a:headEnd/>
-                <a:tailEnd/>
-              </a14:hiddenLine>
-            </a:ext>
-          </a:extLst>
-        </p:spPr>
-      </p:pic>
-      <p:sp>
-        <p:nvSpPr>
-          <p:cNvPr id="4" name="Titre 3"/>
-          <p:cNvSpPr>
-            <a:spLocks noGrp="1"/>
-          </p:cNvSpPr>
-          <p:nvPr>
-            <p:ph type="title"/>
-          </p:nvPr>
-        </p:nvSpPr>
-        <p:spPr/>
-        <p:txBody>
-          <a:bodyPr/>
-          <a:lstStyle/>
-          <a:p>
-            <a:r>
-              <a:rPr lang="fr-FR" dirty="0">
-                <a:solidFill>
-                  <a:schemeClr val="bg1"/>
-                </a:solidFill>
-              </a:rPr>
-              <a:t>Exemple 1</a:t>
-            </a:r>
-          </a:p>
-        </p:txBody>
-      </p:sp>
-      <p:sp>
-        <p:nvSpPr>
-          <p:cNvPr id="2" name="Espace réservé du contenu 1"/>
-          <p:cNvSpPr>
-            <a:spLocks noGrp="1"/>
-          </p:cNvSpPr>
-          <p:nvPr>
-            <p:ph idx="1"/>
-          </p:nvPr>
-        </p:nvSpPr>
-        <p:spPr/>
-        <p:txBody>
-          <a:bodyPr/>
-          <a:lstStyle/>
-          <a:p>
-            <a:endParaRPr lang="fr-FR" sz="2000" dirty="0"/>
-          </a:p>
-          <a:p>
-            <a:pPr eaLnBrk="0" hangingPunct="0">
-              <a:spcBef>
-                <a:spcPct val="50000"/>
-              </a:spcBef>
-              <a:defRPr/>
-            </a:pPr>
-            <a:br>
-              <a:rPr lang="fr-FR" sz="1400" dirty="0">
-                <a:solidFill>
-                  <a:schemeClr val="tx1"/>
-                </a:solidFill>
-                <a:cs typeface="Times New Roman" pitchFamily="18" charset="0"/>
-              </a:rPr>
-            </a:br>
-            <a:endParaRPr lang="fr-FR" sz="1400" dirty="0">
-              <a:solidFill>
-                <a:schemeClr val="tx1"/>
-              </a:solidFill>
-              <a:cs typeface="Times New Roman" pitchFamily="18" charset="0"/>
-            </a:endParaRPr>
-          </a:p>
-        </p:txBody>
-      </p:sp>
-      <p:sp>
-        <p:nvSpPr>
-          <p:cNvPr id="3" name="ZoneTexte 2"/>
-          <p:cNvSpPr txBox="1"/>
-          <p:nvPr/>
-        </p:nvSpPr>
-        <p:spPr>
-          <a:xfrm>
-            <a:off x="1391495" y="987574"/>
-            <a:ext cx="1840568" cy="307777"/>
-          </a:xfrm>
-          <a:prstGeom prst="rect">
-            <a:avLst/>
-          </a:prstGeom>
-          <a:noFill/>
-        </p:spPr>
-        <p:txBody>
-          <a:bodyPr wrap="none" rtlCol="0">
-            <a:spAutoFit/>
-          </a:bodyPr>
-          <a:lstStyle/>
-          <a:p>
-            <a:r>
-              <a:rPr lang="fr-FR" dirty="0"/>
-              <a:t>Exemple non valide</a:t>
-            </a:r>
-          </a:p>
-        </p:txBody>
-      </p:sp>
-    </p:spTree>
-    <p:extLst>
-      <p:ext uri="{BB962C8B-B14F-4D97-AF65-F5344CB8AC3E}">
-        <p14:creationId xmlns:p14="http://schemas.microsoft.com/office/powerpoint/2010/main" val="847171944"/>
-      </p:ext>
-    </p:extLst>
-  </p:cSld>
-  <p:clrMapOvr>
-    <a:masterClrMapping/>
-  </p:clrMapOvr>
-  <p:transition spd="med">
-    <p:fade/>
-  </p:transition>
-</p:sld>
-</file>
-
-<file path=ppt/slides/slide50.xml><?xml version="1.0" encoding="utf-8"?>
+<file path=ppt/slides/slide49.xml><?xml version="1.0" encoding="utf-8"?>
 <p:sld xmlns:a="http://schemas.openxmlformats.org/drawingml/2006/main" xmlns:r="http://schemas.openxmlformats.org/officeDocument/2006/relationships" xmlns:p="http://schemas.openxmlformats.org/presentationml/2006/main">
   <p:cSld>
     <p:spTree>
@@ -29635,7 +29295,190 @@
 </p:sld>
 </file>
 
-<file path=ppt/slides/slide51.xml><?xml version="1.0" encoding="utf-8"?>
+<file path=ppt/slides/slide5.xml><?xml version="1.0" encoding="utf-8"?>
+<p:sld xmlns:a="http://schemas.openxmlformats.org/drawingml/2006/main" xmlns:r="http://schemas.openxmlformats.org/officeDocument/2006/relationships" xmlns:p="http://schemas.openxmlformats.org/presentationml/2006/main">
+  <p:cSld>
+    <p:spTree>
+      <p:nvGrpSpPr>
+        <p:cNvPr id="1" name=""/>
+        <p:cNvGrpSpPr/>
+        <p:nvPr/>
+      </p:nvGrpSpPr>
+      <p:grpSpPr>
+        <a:xfrm>
+          <a:off x="0" y="0"/>
+          <a:ext cx="0" cy="0"/>
+          <a:chOff x="0" y="0"/>
+          <a:chExt cx="0" cy="0"/>
+        </a:xfrm>
+      </p:grpSpPr>
+      <p:pic>
+        <p:nvPicPr>
+          <p:cNvPr id="8" name="Picture 4"/>
+          <p:cNvPicPr>
+            <a:picLocks noChangeAspect="1" noChangeArrowheads="1"/>
+          </p:cNvPicPr>
+          <p:nvPr/>
+        </p:nvPicPr>
+        <p:blipFill>
+          <a:blip r:embed="rId2">
+            <a:extLst>
+              <a:ext uri="{28A0092B-C50C-407E-A947-70E740481C1C}">
+                <a14:useLocalDpi xmlns:a14="http://schemas.microsoft.com/office/drawing/2010/main" val="0"/>
+              </a:ext>
+            </a:extLst>
+          </a:blip>
+          <a:srcRect/>
+          <a:stretch>
+            <a:fillRect/>
+          </a:stretch>
+        </p:blipFill>
+        <p:spPr bwMode="auto">
+          <a:xfrm>
+            <a:off x="3653304" y="1203598"/>
+            <a:ext cx="1783114" cy="2814311"/>
+          </a:xfrm>
+          <a:prstGeom prst="rect">
+            <a:avLst/>
+          </a:prstGeom>
+          <a:noFill/>
+          <a:ln>
+            <a:noFill/>
+          </a:ln>
+          <a:extLst>
+            <a:ext uri="{909E8E84-426E-40DD-AFC4-6F175D3DCCD1}">
+              <a14:hiddenFill xmlns:a14="http://schemas.microsoft.com/office/drawing/2010/main">
+                <a:solidFill>
+                  <a:srgbClr val="FFFFFF"/>
+                </a:solidFill>
+              </a14:hiddenFill>
+            </a:ext>
+            <a:ext uri="{91240B29-F687-4F45-9708-019B960494DF}">
+              <a14:hiddenLine xmlns:a14="http://schemas.microsoft.com/office/drawing/2010/main" w="9525">
+                <a:solidFill>
+                  <a:srgbClr val="000000"/>
+                </a:solidFill>
+                <a:miter lim="800000"/>
+                <a:headEnd/>
+                <a:tailEnd/>
+              </a14:hiddenLine>
+            </a:ext>
+          </a:extLst>
+        </p:spPr>
+      </p:pic>
+      <p:sp>
+        <p:nvSpPr>
+          <p:cNvPr id="4" name="Titre 3"/>
+          <p:cNvSpPr>
+            <a:spLocks noGrp="1"/>
+          </p:cNvSpPr>
+          <p:nvPr>
+            <p:ph type="title"/>
+          </p:nvPr>
+        </p:nvSpPr>
+        <p:spPr/>
+        <p:txBody>
+          <a:bodyPr/>
+          <a:lstStyle/>
+          <a:p>
+            <a:r>
+              <a:rPr lang="fr-FR" dirty="0">
+                <a:solidFill>
+                  <a:schemeClr val="bg1"/>
+                </a:solidFill>
+              </a:rPr>
+              <a:t>Exemple 1</a:t>
+            </a:r>
+          </a:p>
+        </p:txBody>
+      </p:sp>
+      <p:sp>
+        <p:nvSpPr>
+          <p:cNvPr id="2" name="Espace réservé du contenu 1"/>
+          <p:cNvSpPr>
+            <a:spLocks noGrp="1"/>
+          </p:cNvSpPr>
+          <p:nvPr>
+            <p:ph idx="1"/>
+          </p:nvPr>
+        </p:nvSpPr>
+        <p:spPr/>
+        <p:txBody>
+          <a:bodyPr/>
+          <a:lstStyle/>
+          <a:p>
+            <a:endParaRPr lang="fr-FR" sz="2000" dirty="0"/>
+          </a:p>
+          <a:p>
+            <a:pPr eaLnBrk="0" hangingPunct="0">
+              <a:spcBef>
+                <a:spcPct val="50000"/>
+              </a:spcBef>
+              <a:defRPr/>
+            </a:pPr>
+            <a:br>
+              <a:rPr lang="fr-FR" sz="1400" dirty="0">
+                <a:solidFill>
+                  <a:schemeClr val="tx1"/>
+                </a:solidFill>
+                <a:cs typeface="Times New Roman" pitchFamily="18" charset="0"/>
+              </a:rPr>
+            </a:br>
+            <a:endParaRPr lang="fr-FR" sz="1400" dirty="0">
+              <a:solidFill>
+                <a:schemeClr val="tx1"/>
+              </a:solidFill>
+              <a:cs typeface="Times New Roman" pitchFamily="18" charset="0"/>
+            </a:endParaRPr>
+          </a:p>
+        </p:txBody>
+      </p:sp>
+      <p:sp>
+        <p:nvSpPr>
+          <p:cNvPr id="3" name="ZoneTexte 2"/>
+          <p:cNvSpPr txBox="1"/>
+          <p:nvPr/>
+        </p:nvSpPr>
+        <p:spPr>
+          <a:xfrm>
+            <a:off x="1391495" y="987574"/>
+            <a:ext cx="1840568" cy="307777"/>
+          </a:xfrm>
+          <a:prstGeom prst="rect">
+            <a:avLst/>
+          </a:prstGeom>
+          <a:noFill/>
+        </p:spPr>
+        <p:txBody>
+          <a:bodyPr wrap="none" rtlCol="0">
+            <a:spAutoFit/>
+          </a:bodyPr>
+          <a:lstStyle/>
+          <a:p>
+            <a:r>
+              <a:rPr lang="fr-FR" dirty="0"/>
+              <a:t>Exemple non valide</a:t>
+            </a:r>
+          </a:p>
+        </p:txBody>
+      </p:sp>
+    </p:spTree>
+    <p:extLst>
+      <p:ext uri="{BB962C8B-B14F-4D97-AF65-F5344CB8AC3E}">
+        <p14:creationId xmlns:p14="http://schemas.microsoft.com/office/powerpoint/2010/main" val="847171944"/>
+      </p:ext>
+    </p:extLst>
+  </p:cSld>
+  <p:clrMapOvr>
+    <a:masterClrMapping/>
+  </p:clrMapOvr>
+  <p:transition spd="med">
+    <p:fade/>
+  </p:transition>
+</p:sld>
+</file>
+
+<file path=ppt/slides/slide50.xml><?xml version="1.0" encoding="utf-8"?>
 <p:sld xmlns:a="http://schemas.openxmlformats.org/drawingml/2006/main" xmlns:r="http://schemas.openxmlformats.org/officeDocument/2006/relationships" xmlns:p="http://schemas.openxmlformats.org/presentationml/2006/main">
   <p:cSld>
     <p:spTree>
@@ -29993,6 +29836,297 @@
     <p:extLst>
       <p:ext uri="{BB962C8B-B14F-4D97-AF65-F5344CB8AC3E}">
         <p14:creationId xmlns:p14="http://schemas.microsoft.com/office/powerpoint/2010/main" val="2679325714"/>
+      </p:ext>
+    </p:extLst>
+  </p:cSld>
+  <p:clrMapOvr>
+    <a:masterClrMapping/>
+  </p:clrMapOvr>
+  <p:transition spd="med">
+    <p:fade/>
+  </p:transition>
+</p:sld>
+</file>
+
+<file path=ppt/slides/slide51.xml><?xml version="1.0" encoding="utf-8"?>
+<p:sld xmlns:a="http://schemas.openxmlformats.org/drawingml/2006/main" xmlns:r="http://schemas.openxmlformats.org/officeDocument/2006/relationships" xmlns:p="http://schemas.openxmlformats.org/presentationml/2006/main">
+  <p:cSld>
+    <p:spTree>
+      <p:nvGrpSpPr>
+        <p:cNvPr id="1" name=""/>
+        <p:cNvGrpSpPr/>
+        <p:nvPr/>
+      </p:nvGrpSpPr>
+      <p:grpSpPr>
+        <a:xfrm>
+          <a:off x="0" y="0"/>
+          <a:ext cx="0" cy="0"/>
+          <a:chOff x="0" y="0"/>
+          <a:chExt cx="0" cy="0"/>
+        </a:xfrm>
+      </p:grpSpPr>
+      <p:sp>
+        <p:nvSpPr>
+          <p:cNvPr id="2" name="Espace réservé du contenu 1"/>
+          <p:cNvSpPr>
+            <a:spLocks noGrp="1"/>
+          </p:cNvSpPr>
+          <p:nvPr>
+            <p:ph idx="1"/>
+          </p:nvPr>
+        </p:nvSpPr>
+        <p:spPr>
+          <a:noFill/>
+          <a:extLst>
+            <a:ext uri="{909E8E84-426E-40DD-AFC4-6F175D3DCCD1}">
+              <a14:hiddenFill xmlns:a14="http://schemas.microsoft.com/office/drawing/2010/main">
+                <a:solidFill>
+                  <a:srgbClr val="FFFFFF"/>
+                </a:solidFill>
+              </a14:hiddenFill>
+            </a:ext>
+          </a:extLst>
+        </p:spPr>
+        <p:txBody>
+          <a:bodyPr/>
+          <a:lstStyle/>
+          <a:p>
+            <a:r>
+              <a:rPr lang="fr-FR" sz="2000" dirty="0"/>
+              <a:t>Prévenir l’utilisateur de l’ouverture d’une nouvelle fenêtre ou modale</a:t>
+            </a:r>
+          </a:p>
+          <a:p>
+            <a:endParaRPr lang="fr-FR" sz="2000" dirty="0"/>
+          </a:p>
+          <a:p>
+            <a:endParaRPr lang="fr-FR" sz="2000" dirty="0"/>
+          </a:p>
+          <a:p>
+            <a:pPr>
+              <a:lnSpc>
+                <a:spcPct val="100000"/>
+              </a:lnSpc>
+            </a:pPr>
+            <a:r>
+              <a:rPr lang="fr-FR" sz="1400" dirty="0">
+                <a:solidFill>
+                  <a:schemeClr val="tx1"/>
+                </a:solidFill>
+              </a:rPr>
+              <a:t>Pour qui : </a:t>
+            </a:r>
+          </a:p>
+          <a:p>
+            <a:pPr>
+              <a:lnSpc>
+                <a:spcPct val="100000"/>
+              </a:lnSpc>
+            </a:pPr>
+            <a:r>
+              <a:rPr lang="fr-FR" sz="1400" dirty="0">
+                <a:solidFill>
+                  <a:schemeClr val="tx1"/>
+                </a:solidFill>
+                <a:latin typeface="Arial" panose="020B0604020202020204" pitchFamily="34" charset="0"/>
+                <a:cs typeface="Arial" panose="020B0604020202020204" pitchFamily="34" charset="0"/>
+              </a:rPr>
+              <a:t>Les personnes déficientes visuelles et cognitives.</a:t>
+            </a:r>
+          </a:p>
+          <a:p>
+            <a:pPr>
+              <a:lnSpc>
+                <a:spcPct val="100000"/>
+              </a:lnSpc>
+            </a:pPr>
+            <a:endParaRPr lang="fr-FR" sz="1400" dirty="0">
+              <a:solidFill>
+                <a:schemeClr val="tx1"/>
+              </a:solidFill>
+              <a:latin typeface="Arial" panose="020B0604020202020204" pitchFamily="34" charset="0"/>
+              <a:cs typeface="Arial" panose="020B0604020202020204" pitchFamily="34" charset="0"/>
+            </a:endParaRPr>
+          </a:p>
+          <a:p>
+            <a:pPr>
+              <a:lnSpc>
+                <a:spcPct val="100000"/>
+              </a:lnSpc>
+            </a:pPr>
+            <a:r>
+              <a:rPr lang="fr-FR" sz="1400" dirty="0">
+                <a:solidFill>
+                  <a:schemeClr val="tx1"/>
+                </a:solidFill>
+              </a:rPr>
+              <a:t>Quand : </a:t>
+            </a:r>
+          </a:p>
+          <a:p>
+            <a:pPr>
+              <a:lnSpc>
+                <a:spcPct val="100000"/>
+              </a:lnSpc>
+            </a:pPr>
+            <a:r>
+              <a:rPr lang="fr-FR" sz="1400" dirty="0">
+                <a:solidFill>
+                  <a:schemeClr val="tx1"/>
+                </a:solidFill>
+                <a:latin typeface="Arial" panose="020B0604020202020204" pitchFamily="34" charset="0"/>
+                <a:cs typeface="Arial" panose="020B0604020202020204" pitchFamily="34" charset="0"/>
+              </a:rPr>
+              <a:t>Dès la conception et pendant le développement</a:t>
+            </a:r>
+          </a:p>
+          <a:p>
+            <a:pPr>
+              <a:lnSpc>
+                <a:spcPct val="100000"/>
+              </a:lnSpc>
+            </a:pPr>
+            <a:endParaRPr lang="fr-FR" sz="1400" dirty="0">
+              <a:solidFill>
+                <a:schemeClr val="tx1"/>
+              </a:solidFill>
+              <a:latin typeface="Arial" panose="020B0604020202020204" pitchFamily="34" charset="0"/>
+              <a:cs typeface="Arial" panose="020B0604020202020204" pitchFamily="34" charset="0"/>
+            </a:endParaRPr>
+          </a:p>
+          <a:p>
+            <a:pPr>
+              <a:lnSpc>
+                <a:spcPct val="100000"/>
+              </a:lnSpc>
+            </a:pPr>
+            <a:endParaRPr lang="fr-FR" sz="1400" dirty="0">
+              <a:solidFill>
+                <a:schemeClr val="tx1"/>
+              </a:solidFill>
+              <a:latin typeface="Arial" panose="020B0604020202020204" pitchFamily="34" charset="0"/>
+              <a:cs typeface="Arial" panose="020B0604020202020204" pitchFamily="34" charset="0"/>
+            </a:endParaRPr>
+          </a:p>
+          <a:p>
+            <a:pPr>
+              <a:lnSpc>
+                <a:spcPct val="100000"/>
+              </a:lnSpc>
+            </a:pPr>
+            <a:r>
+              <a:rPr lang="fr-FR" sz="1400" dirty="0">
+                <a:solidFill>
+                  <a:schemeClr val="tx1"/>
+                </a:solidFill>
+              </a:rPr>
+              <a:t>Description : </a:t>
+            </a:r>
+          </a:p>
+          <a:p>
+            <a:r>
+              <a:rPr lang="fr-FR" sz="1400" dirty="0">
+                <a:solidFill>
+                  <a:schemeClr val="tx1"/>
+                </a:solidFill>
+                <a:latin typeface="Arial" panose="020B0604020202020204" pitchFamily="34" charset="0"/>
+                <a:cs typeface="Arial" panose="020B0604020202020204" pitchFamily="34" charset="0"/>
+              </a:rPr>
+              <a:t>Prévenir l'utilisateur de l'ouverture de toute nouvelle fenêtre. </a:t>
+            </a:r>
+          </a:p>
+          <a:p>
+            <a:pPr marL="285750" indent="-285750">
+              <a:buFont typeface="Arial" panose="020B0604020202020204" pitchFamily="34" charset="0"/>
+              <a:buChar char="•"/>
+            </a:pPr>
+            <a:r>
+              <a:rPr lang="fr-FR" sz="1400" dirty="0">
+                <a:solidFill>
+                  <a:schemeClr val="tx1"/>
+                </a:solidFill>
+                <a:latin typeface="Arial" panose="020B0604020202020204" pitchFamily="34" charset="0"/>
+                <a:cs typeface="Arial" panose="020B0604020202020204" pitchFamily="34" charset="0"/>
+              </a:rPr>
+              <a:t>Texte en masquage accessible: « nouvelle fenêtre ».</a:t>
+            </a:r>
+          </a:p>
+          <a:p>
+            <a:pPr marL="285750" indent="-285750">
+              <a:buFont typeface="Arial" panose="020B0604020202020204" pitchFamily="34" charset="0"/>
+              <a:buChar char="•"/>
+            </a:pPr>
+            <a:r>
+              <a:rPr lang="fr-FR" sz="1400" dirty="0">
+                <a:solidFill>
+                  <a:schemeClr val="tx1"/>
+                </a:solidFill>
+                <a:latin typeface="Arial" panose="020B0604020202020204" pitchFamily="34" charset="0"/>
+                <a:cs typeface="Arial" panose="020B0604020202020204" pitchFamily="34" charset="0"/>
+              </a:rPr>
+              <a:t>Image avec attribut </a:t>
+            </a:r>
+            <a:r>
+              <a:rPr lang="fr-FR" sz="1400" b="1" dirty="0">
+                <a:solidFill>
+                  <a:schemeClr val="tx1"/>
+                </a:solidFill>
+                <a:latin typeface="Arial" panose="020B0604020202020204" pitchFamily="34" charset="0"/>
+                <a:cs typeface="Arial" panose="020B0604020202020204" pitchFamily="34" charset="0"/>
+              </a:rPr>
+              <a:t>alt</a:t>
+            </a:r>
+            <a:r>
+              <a:rPr lang="fr-FR" sz="1400" dirty="0">
+                <a:solidFill>
+                  <a:schemeClr val="tx1"/>
+                </a:solidFill>
+                <a:latin typeface="Arial" panose="020B0604020202020204" pitchFamily="34" charset="0"/>
+                <a:cs typeface="Arial" panose="020B0604020202020204" pitchFamily="34" charset="0"/>
+              </a:rPr>
+              <a:t> : « nouvelle fenêtre ».</a:t>
+            </a:r>
+          </a:p>
+          <a:p>
+            <a:pPr marL="285750" indent="-285750">
+              <a:buFont typeface="Arial" panose="020B0604020202020204" pitchFamily="34" charset="0"/>
+              <a:buChar char="•"/>
+            </a:pPr>
+            <a:endParaRPr lang="fr-FR" sz="1400" dirty="0">
+              <a:solidFill>
+                <a:schemeClr val="tx1"/>
+              </a:solidFill>
+              <a:latin typeface="Arial" panose="020B0604020202020204" pitchFamily="34" charset="0"/>
+              <a:cs typeface="Arial" panose="020B0604020202020204" pitchFamily="34" charset="0"/>
+            </a:endParaRPr>
+          </a:p>
+          <a:p>
+            <a:r>
+              <a:rPr lang="fr-FR" sz="1400" dirty="0">
+                <a:solidFill>
+                  <a:schemeClr val="tx1"/>
+                </a:solidFill>
+                <a:latin typeface="Arial" panose="020B0604020202020204" pitchFamily="34" charset="0"/>
+                <a:cs typeface="Arial" panose="020B0604020202020204" pitchFamily="34" charset="0"/>
+              </a:rPr>
+              <a:t>Éviter les modale, sinon s’assurer qu’elles soient accessibles</a:t>
+            </a:r>
+          </a:p>
+          <a:p>
+            <a:endParaRPr lang="fr-FR" sz="1400" dirty="0">
+              <a:solidFill>
+                <a:schemeClr val="tx1"/>
+              </a:solidFill>
+              <a:latin typeface="Arial" panose="020B0604020202020204" pitchFamily="34" charset="0"/>
+              <a:cs typeface="Arial" panose="020B0604020202020204" pitchFamily="34" charset="0"/>
+            </a:endParaRPr>
+          </a:p>
+        </p:txBody>
+      </p:sp>
+    </p:spTree>
+    <p:extLst>
+      <p:ext uri="{BB962C8B-B14F-4D97-AF65-F5344CB8AC3E}">
+        <p14:creationId xmlns:p14="http://schemas.microsoft.com/office/powerpoint/2010/main" val="3141091656"/>
       </p:ext>
     </p:extLst>
   </p:cSld>
@@ -30050,297 +30184,6 @@
           <a:p>
             <a:r>
               <a:rPr lang="fr-FR" sz="2000" dirty="0"/>
-              <a:t>Prévenir l’utilisateur de l’ouverture d’une nouvelle fenêtre ou modale</a:t>
-            </a:r>
-          </a:p>
-          <a:p>
-            <a:endParaRPr lang="fr-FR" sz="2000" dirty="0"/>
-          </a:p>
-          <a:p>
-            <a:endParaRPr lang="fr-FR" sz="2000" dirty="0"/>
-          </a:p>
-          <a:p>
-            <a:pPr>
-              <a:lnSpc>
-                <a:spcPct val="100000"/>
-              </a:lnSpc>
-            </a:pPr>
-            <a:r>
-              <a:rPr lang="fr-FR" sz="1400" dirty="0">
-                <a:solidFill>
-                  <a:schemeClr val="tx1"/>
-                </a:solidFill>
-              </a:rPr>
-              <a:t>Pour qui : </a:t>
-            </a:r>
-          </a:p>
-          <a:p>
-            <a:pPr>
-              <a:lnSpc>
-                <a:spcPct val="100000"/>
-              </a:lnSpc>
-            </a:pPr>
-            <a:r>
-              <a:rPr lang="fr-FR" sz="1400" dirty="0">
-                <a:solidFill>
-                  <a:schemeClr val="tx1"/>
-                </a:solidFill>
-                <a:latin typeface="Arial" panose="020B0604020202020204" pitchFamily="34" charset="0"/>
-                <a:cs typeface="Arial" panose="020B0604020202020204" pitchFamily="34" charset="0"/>
-              </a:rPr>
-              <a:t>Les personnes déficientes visuelles et cognitives.</a:t>
-            </a:r>
-          </a:p>
-          <a:p>
-            <a:pPr>
-              <a:lnSpc>
-                <a:spcPct val="100000"/>
-              </a:lnSpc>
-            </a:pPr>
-            <a:endParaRPr lang="fr-FR" sz="1400" dirty="0">
-              <a:solidFill>
-                <a:schemeClr val="tx1"/>
-              </a:solidFill>
-              <a:latin typeface="Arial" panose="020B0604020202020204" pitchFamily="34" charset="0"/>
-              <a:cs typeface="Arial" panose="020B0604020202020204" pitchFamily="34" charset="0"/>
-            </a:endParaRPr>
-          </a:p>
-          <a:p>
-            <a:pPr>
-              <a:lnSpc>
-                <a:spcPct val="100000"/>
-              </a:lnSpc>
-            </a:pPr>
-            <a:r>
-              <a:rPr lang="fr-FR" sz="1400" dirty="0">
-                <a:solidFill>
-                  <a:schemeClr val="tx1"/>
-                </a:solidFill>
-              </a:rPr>
-              <a:t>Quand : </a:t>
-            </a:r>
-          </a:p>
-          <a:p>
-            <a:pPr>
-              <a:lnSpc>
-                <a:spcPct val="100000"/>
-              </a:lnSpc>
-            </a:pPr>
-            <a:r>
-              <a:rPr lang="fr-FR" sz="1400" dirty="0">
-                <a:solidFill>
-                  <a:schemeClr val="tx1"/>
-                </a:solidFill>
-                <a:latin typeface="Arial" panose="020B0604020202020204" pitchFamily="34" charset="0"/>
-                <a:cs typeface="Arial" panose="020B0604020202020204" pitchFamily="34" charset="0"/>
-              </a:rPr>
-              <a:t>Dès la conception et pendant le développement</a:t>
-            </a:r>
-          </a:p>
-          <a:p>
-            <a:pPr>
-              <a:lnSpc>
-                <a:spcPct val="100000"/>
-              </a:lnSpc>
-            </a:pPr>
-            <a:endParaRPr lang="fr-FR" sz="1400" dirty="0">
-              <a:solidFill>
-                <a:schemeClr val="tx1"/>
-              </a:solidFill>
-              <a:latin typeface="Arial" panose="020B0604020202020204" pitchFamily="34" charset="0"/>
-              <a:cs typeface="Arial" panose="020B0604020202020204" pitchFamily="34" charset="0"/>
-            </a:endParaRPr>
-          </a:p>
-          <a:p>
-            <a:pPr>
-              <a:lnSpc>
-                <a:spcPct val="100000"/>
-              </a:lnSpc>
-            </a:pPr>
-            <a:endParaRPr lang="fr-FR" sz="1400" dirty="0">
-              <a:solidFill>
-                <a:schemeClr val="tx1"/>
-              </a:solidFill>
-              <a:latin typeface="Arial" panose="020B0604020202020204" pitchFamily="34" charset="0"/>
-              <a:cs typeface="Arial" panose="020B0604020202020204" pitchFamily="34" charset="0"/>
-            </a:endParaRPr>
-          </a:p>
-          <a:p>
-            <a:pPr>
-              <a:lnSpc>
-                <a:spcPct val="100000"/>
-              </a:lnSpc>
-            </a:pPr>
-            <a:r>
-              <a:rPr lang="fr-FR" sz="1400" dirty="0">
-                <a:solidFill>
-                  <a:schemeClr val="tx1"/>
-                </a:solidFill>
-              </a:rPr>
-              <a:t>Description : </a:t>
-            </a:r>
-          </a:p>
-          <a:p>
-            <a:r>
-              <a:rPr lang="fr-FR" sz="1400" dirty="0">
-                <a:solidFill>
-                  <a:schemeClr val="tx1"/>
-                </a:solidFill>
-                <a:latin typeface="Arial" panose="020B0604020202020204" pitchFamily="34" charset="0"/>
-                <a:cs typeface="Arial" panose="020B0604020202020204" pitchFamily="34" charset="0"/>
-              </a:rPr>
-              <a:t>Prévenir l'utilisateur de l'ouverture de toute nouvelle fenêtre. </a:t>
-            </a:r>
-          </a:p>
-          <a:p>
-            <a:pPr marL="285750" indent="-285750">
-              <a:buFont typeface="Arial" panose="020B0604020202020204" pitchFamily="34" charset="0"/>
-              <a:buChar char="•"/>
-            </a:pPr>
-            <a:r>
-              <a:rPr lang="fr-FR" sz="1400" dirty="0">
-                <a:solidFill>
-                  <a:schemeClr val="tx1"/>
-                </a:solidFill>
-                <a:latin typeface="Arial" panose="020B0604020202020204" pitchFamily="34" charset="0"/>
-                <a:cs typeface="Arial" panose="020B0604020202020204" pitchFamily="34" charset="0"/>
-              </a:rPr>
-              <a:t>Texte en masquage accessible: « nouvelle fenêtre ».</a:t>
-            </a:r>
-          </a:p>
-          <a:p>
-            <a:pPr marL="285750" indent="-285750">
-              <a:buFont typeface="Arial" panose="020B0604020202020204" pitchFamily="34" charset="0"/>
-              <a:buChar char="•"/>
-            </a:pPr>
-            <a:r>
-              <a:rPr lang="fr-FR" sz="1400" dirty="0">
-                <a:solidFill>
-                  <a:schemeClr val="tx1"/>
-                </a:solidFill>
-                <a:latin typeface="Arial" panose="020B0604020202020204" pitchFamily="34" charset="0"/>
-                <a:cs typeface="Arial" panose="020B0604020202020204" pitchFamily="34" charset="0"/>
-              </a:rPr>
-              <a:t>Image avec attribut </a:t>
-            </a:r>
-            <a:r>
-              <a:rPr lang="fr-FR" sz="1400" b="1" dirty="0">
-                <a:solidFill>
-                  <a:schemeClr val="tx1"/>
-                </a:solidFill>
-                <a:latin typeface="Arial" panose="020B0604020202020204" pitchFamily="34" charset="0"/>
-                <a:cs typeface="Arial" panose="020B0604020202020204" pitchFamily="34" charset="0"/>
-              </a:rPr>
-              <a:t>alt</a:t>
-            </a:r>
-            <a:r>
-              <a:rPr lang="fr-FR" sz="1400" dirty="0">
-                <a:solidFill>
-                  <a:schemeClr val="tx1"/>
-                </a:solidFill>
-                <a:latin typeface="Arial" panose="020B0604020202020204" pitchFamily="34" charset="0"/>
-                <a:cs typeface="Arial" panose="020B0604020202020204" pitchFamily="34" charset="0"/>
-              </a:rPr>
-              <a:t> : « nouvelle fenêtre ».</a:t>
-            </a:r>
-          </a:p>
-          <a:p>
-            <a:pPr marL="285750" indent="-285750">
-              <a:buFont typeface="Arial" panose="020B0604020202020204" pitchFamily="34" charset="0"/>
-              <a:buChar char="•"/>
-            </a:pPr>
-            <a:endParaRPr lang="fr-FR" sz="1400" dirty="0">
-              <a:solidFill>
-                <a:schemeClr val="tx1"/>
-              </a:solidFill>
-              <a:latin typeface="Arial" panose="020B0604020202020204" pitchFamily="34" charset="0"/>
-              <a:cs typeface="Arial" panose="020B0604020202020204" pitchFamily="34" charset="0"/>
-            </a:endParaRPr>
-          </a:p>
-          <a:p>
-            <a:r>
-              <a:rPr lang="fr-FR" sz="1400" dirty="0">
-                <a:solidFill>
-                  <a:schemeClr val="tx1"/>
-                </a:solidFill>
-                <a:latin typeface="Arial" panose="020B0604020202020204" pitchFamily="34" charset="0"/>
-                <a:cs typeface="Arial" panose="020B0604020202020204" pitchFamily="34" charset="0"/>
-              </a:rPr>
-              <a:t>Éviter les modale, sinon s’assurer qu’elles soient accessibles</a:t>
-            </a:r>
-          </a:p>
-          <a:p>
-            <a:endParaRPr lang="fr-FR" sz="1400" dirty="0">
-              <a:solidFill>
-                <a:schemeClr val="tx1"/>
-              </a:solidFill>
-              <a:latin typeface="Arial" panose="020B0604020202020204" pitchFamily="34" charset="0"/>
-              <a:cs typeface="Arial" panose="020B0604020202020204" pitchFamily="34" charset="0"/>
-            </a:endParaRPr>
-          </a:p>
-        </p:txBody>
-      </p:sp>
-    </p:spTree>
-    <p:extLst>
-      <p:ext uri="{BB962C8B-B14F-4D97-AF65-F5344CB8AC3E}">
-        <p14:creationId xmlns:p14="http://schemas.microsoft.com/office/powerpoint/2010/main" val="3141091656"/>
-      </p:ext>
-    </p:extLst>
-  </p:cSld>
-  <p:clrMapOvr>
-    <a:masterClrMapping/>
-  </p:clrMapOvr>
-  <p:transition spd="med">
-    <p:fade/>
-  </p:transition>
-</p:sld>
-</file>
-
-<file path=ppt/slides/slide53.xml><?xml version="1.0" encoding="utf-8"?>
-<p:sld xmlns:a="http://schemas.openxmlformats.org/drawingml/2006/main" xmlns:r="http://schemas.openxmlformats.org/officeDocument/2006/relationships" xmlns:p="http://schemas.openxmlformats.org/presentationml/2006/main">
-  <p:cSld>
-    <p:spTree>
-      <p:nvGrpSpPr>
-        <p:cNvPr id="1" name=""/>
-        <p:cNvGrpSpPr/>
-        <p:nvPr/>
-      </p:nvGrpSpPr>
-      <p:grpSpPr>
-        <a:xfrm>
-          <a:off x="0" y="0"/>
-          <a:ext cx="0" cy="0"/>
-          <a:chOff x="0" y="0"/>
-          <a:chExt cx="0" cy="0"/>
-        </a:xfrm>
-      </p:grpSpPr>
-      <p:sp>
-        <p:nvSpPr>
-          <p:cNvPr id="2" name="Espace réservé du contenu 1"/>
-          <p:cNvSpPr>
-            <a:spLocks noGrp="1"/>
-          </p:cNvSpPr>
-          <p:nvPr>
-            <p:ph idx="1"/>
-          </p:nvPr>
-        </p:nvSpPr>
-        <p:spPr>
-          <a:noFill/>
-          <a:extLst>
-            <a:ext uri="{909E8E84-426E-40DD-AFC4-6F175D3DCCD1}">
-              <a14:hiddenFill xmlns:a14="http://schemas.microsoft.com/office/drawing/2010/main">
-                <a:solidFill>
-                  <a:srgbClr val="FFFFFF"/>
-                </a:solidFill>
-              </a14:hiddenFill>
-            </a:ext>
-          </a:extLst>
-        </p:spPr>
-        <p:txBody>
-          <a:bodyPr/>
-          <a:lstStyle/>
-          <a:p>
-            <a:r>
-              <a:rPr lang="fr-FR" sz="2000" dirty="0"/>
               <a:t>Prévenir l’utilisateur de l’ouverture d’une nouvelle fenêtre</a:t>
             </a:r>
           </a:p>
@@ -30495,7 +30338,7 @@
 </p:sld>
 </file>
 
-<file path=ppt/slides/slide54.xml><?xml version="1.0" encoding="utf-8"?>
+<file path=ppt/slides/slide53.xml><?xml version="1.0" encoding="utf-8"?>
 <p:sld xmlns:a="http://schemas.openxmlformats.org/drawingml/2006/main" xmlns:r="http://schemas.openxmlformats.org/officeDocument/2006/relationships" xmlns:p="http://schemas.openxmlformats.org/presentationml/2006/main">
   <p:cSld>
     <p:spTree>
@@ -30826,6 +30669,238 @@
     <p:extLst>
       <p:ext uri="{BB962C8B-B14F-4D97-AF65-F5344CB8AC3E}">
         <p14:creationId xmlns:p14="http://schemas.microsoft.com/office/powerpoint/2010/main" val="2460329654"/>
+      </p:ext>
+    </p:extLst>
+  </p:cSld>
+  <p:clrMapOvr>
+    <a:masterClrMapping/>
+  </p:clrMapOvr>
+  <p:transition spd="med">
+    <p:fade/>
+  </p:transition>
+</p:sld>
+</file>
+
+<file path=ppt/slides/slide54.xml><?xml version="1.0" encoding="utf-8"?>
+<p:sld xmlns:a="http://schemas.openxmlformats.org/drawingml/2006/main" xmlns:r="http://schemas.openxmlformats.org/officeDocument/2006/relationships" xmlns:p="http://schemas.openxmlformats.org/presentationml/2006/main">
+  <p:cSld>
+    <p:spTree>
+      <p:nvGrpSpPr>
+        <p:cNvPr id="1" name=""/>
+        <p:cNvGrpSpPr/>
+        <p:nvPr/>
+      </p:nvGrpSpPr>
+      <p:grpSpPr>
+        <a:xfrm>
+          <a:off x="0" y="0"/>
+          <a:ext cx="0" cy="0"/>
+          <a:chOff x="0" y="0"/>
+          <a:chExt cx="0" cy="0"/>
+        </a:xfrm>
+      </p:grpSpPr>
+      <p:sp>
+        <p:nvSpPr>
+          <p:cNvPr id="2" name="Espace réservé du contenu 1"/>
+          <p:cNvSpPr>
+            <a:spLocks noGrp="1"/>
+          </p:cNvSpPr>
+          <p:nvPr>
+            <p:ph idx="1"/>
+          </p:nvPr>
+        </p:nvSpPr>
+        <p:spPr/>
+        <p:txBody>
+          <a:bodyPr/>
+          <a:lstStyle/>
+          <a:p>
+            <a:r>
+              <a:rPr lang="fr-FR" sz="1800" b="1" dirty="0"/>
+              <a:t>Identifier et conserver la cohérence des regroupements et des différentes régions de la page</a:t>
+            </a:r>
+          </a:p>
+          <a:p>
+            <a:endParaRPr lang="fr-FR" sz="1200" dirty="0">
+              <a:solidFill>
+                <a:schemeClr val="tx1"/>
+              </a:solidFill>
+            </a:endParaRPr>
+          </a:p>
+          <a:p>
+            <a:r>
+              <a:rPr lang="fr-FR" sz="1600" dirty="0">
+                <a:solidFill>
+                  <a:schemeClr val="tx1"/>
+                </a:solidFill>
+              </a:rPr>
+              <a:t>Pour qui : </a:t>
+            </a:r>
+          </a:p>
+          <a:p>
+            <a:r>
+              <a:rPr lang="fr-FR" sz="1200" dirty="0">
+                <a:solidFill>
+                  <a:schemeClr val="tx1"/>
+                </a:solidFill>
+              </a:rPr>
+              <a:t>Tout le monde et en particulier les personnes déficientes visuelles, cognitives ou ayant des troubles de l’attention</a:t>
+            </a:r>
+          </a:p>
+          <a:p>
+            <a:endParaRPr lang="fr-FR" sz="1200" dirty="0">
+              <a:solidFill>
+                <a:schemeClr val="tx1"/>
+              </a:solidFill>
+            </a:endParaRPr>
+          </a:p>
+          <a:p>
+            <a:r>
+              <a:rPr lang="fr-FR" sz="1600" dirty="0">
+                <a:solidFill>
+                  <a:schemeClr val="tx1"/>
+                </a:solidFill>
+              </a:rPr>
+              <a:t>Quand :</a:t>
+            </a:r>
+          </a:p>
+          <a:p>
+            <a:r>
+              <a:rPr lang="fr-FR" sz="1200" dirty="0">
+                <a:solidFill>
+                  <a:schemeClr val="tx1"/>
+                </a:solidFill>
+              </a:rPr>
+              <a:t>Dès la conception</a:t>
+            </a:r>
+          </a:p>
+          <a:p>
+            <a:endParaRPr lang="fr-FR" sz="1200" dirty="0">
+              <a:solidFill>
+                <a:schemeClr val="tx1"/>
+              </a:solidFill>
+            </a:endParaRPr>
+          </a:p>
+          <a:p>
+            <a:r>
+              <a:rPr lang="fr-FR" sz="1600" dirty="0">
+                <a:solidFill>
+                  <a:schemeClr val="tx1"/>
+                </a:solidFill>
+              </a:rPr>
+              <a:t>Description :</a:t>
+            </a:r>
+          </a:p>
+          <a:p>
+            <a:r>
+              <a:rPr lang="fr-FR" sz="1200" dirty="0">
+                <a:solidFill>
+                  <a:schemeClr val="tx1"/>
+                </a:solidFill>
+              </a:rPr>
+              <a:t>Fournir des moyens d’identifier et de distinguer visuellement les différentes parties de la page et assurer la cohérence de ces régions ou regroupements dans toutes les pages</a:t>
+            </a:r>
+          </a:p>
+          <a:p>
+            <a:endParaRPr lang="fr-FR" sz="1200" dirty="0">
+              <a:solidFill>
+                <a:schemeClr val="tx1"/>
+              </a:solidFill>
+            </a:endParaRPr>
+          </a:p>
+          <a:p>
+            <a:r>
+              <a:rPr lang="fr-FR" sz="1600" dirty="0">
+                <a:solidFill>
+                  <a:schemeClr val="tx1"/>
+                </a:solidFill>
+              </a:rPr>
+              <a:t>À vérifier :</a:t>
+            </a:r>
+          </a:p>
+          <a:p>
+            <a:pPr marL="171450" indent="-171450">
+              <a:buFont typeface="Arial" panose="020B0604020202020204" pitchFamily="34" charset="0"/>
+              <a:buChar char="•"/>
+            </a:pPr>
+            <a:r>
+              <a:rPr lang="fr-FR" sz="1200" dirty="0">
+                <a:solidFill>
+                  <a:schemeClr val="tx1"/>
+                </a:solidFill>
+              </a:rPr>
+              <a:t>S'assurer que les liens dans le corps du texte sont facilement identifiables visuellement par un autre moyen que la couleur (souligné, gras…) par rapport au reste du texte.</a:t>
+            </a:r>
+          </a:p>
+          <a:p>
+            <a:pPr marL="171450" indent="-171450">
+              <a:buFont typeface="Arial" panose="020B0604020202020204" pitchFamily="34" charset="0"/>
+              <a:buChar char="•"/>
+            </a:pPr>
+            <a:r>
+              <a:rPr lang="fr-FR" sz="1200" dirty="0">
+                <a:solidFill>
+                  <a:schemeClr val="tx1"/>
+                </a:solidFill>
+              </a:rPr>
+              <a:t>S’assurer que les mécanismes de navigation sont toujours situés au même endroit dans un ensemble de page.</a:t>
+            </a:r>
+          </a:p>
+          <a:p>
+            <a:pPr marL="171450" indent="-171450">
+              <a:buFont typeface="Arial" panose="020B0604020202020204" pitchFamily="34" charset="0"/>
+              <a:buChar char="•"/>
+            </a:pPr>
+            <a:r>
+              <a:rPr lang="fr-FR" sz="1200">
+                <a:solidFill>
+                  <a:schemeClr val="tx1"/>
+                </a:solidFill>
+              </a:rPr>
+              <a:t>S’assurer </a:t>
+            </a:r>
+            <a:r>
+              <a:rPr lang="fr-FR" sz="1200" dirty="0">
+                <a:solidFill>
+                  <a:schemeClr val="tx1"/>
+                </a:solidFill>
+              </a:rPr>
+              <a:t>que les composants et les regroupements qui ont la même fonction, sont identifiés (visuellement) de la même façon et, dans la mesure du possible, respecter l’apparence classique de ces éléments pour ne pas perturber l’utilisateur habitué à un aspect spécifique de ceux-ci (par exemple, les liens sont généralement soulignés…).</a:t>
+            </a:r>
+          </a:p>
+          <a:p>
+            <a:pPr marL="171450" indent="-171450">
+              <a:buFont typeface="Arial" panose="020B0604020202020204" pitchFamily="34" charset="0"/>
+              <a:buChar char="•"/>
+            </a:pPr>
+            <a:r>
+              <a:rPr lang="fr-FR" sz="1200">
+                <a:solidFill>
+                  <a:schemeClr val="tx1"/>
+                </a:solidFill>
+              </a:rPr>
+              <a:t>S’assurer </a:t>
+            </a:r>
+            <a:r>
+              <a:rPr lang="fr-FR" sz="1200" dirty="0">
+                <a:solidFill>
+                  <a:schemeClr val="tx1"/>
+                </a:solidFill>
+              </a:rPr>
+              <a:t>que les zones de la page sont clairement délimitées (bordures, filets, contraste suffisant…) ou qu’il y a un moyen de distinguer visuellement les groupes (sous-menu, liste déroulante…) ainsi que les différentes régions de la page.</a:t>
+            </a:r>
+          </a:p>
+          <a:p>
+            <a:endParaRPr lang="fr-FR" sz="1200" dirty="0">
+              <a:solidFill>
+                <a:schemeClr val="tx1"/>
+              </a:solidFill>
+            </a:endParaRPr>
+          </a:p>
+        </p:txBody>
+      </p:sp>
+    </p:spTree>
+    <p:extLst>
+      <p:ext uri="{BB962C8B-B14F-4D97-AF65-F5344CB8AC3E}">
+        <p14:creationId xmlns:p14="http://schemas.microsoft.com/office/powerpoint/2010/main" val="3817232508"/>
       </p:ext>
     </p:extLst>
   </p:cSld>
@@ -30871,238 +30946,6 @@
           <a:lstStyle/>
           <a:p>
             <a:r>
-              <a:rPr lang="fr-FR" sz="1800" b="1" dirty="0"/>
-              <a:t>Identifier et conserver la cohérence des regroupements et des différentes régions de la page</a:t>
-            </a:r>
-          </a:p>
-          <a:p>
-            <a:endParaRPr lang="fr-FR" sz="1200" dirty="0">
-              <a:solidFill>
-                <a:schemeClr val="tx1"/>
-              </a:solidFill>
-            </a:endParaRPr>
-          </a:p>
-          <a:p>
-            <a:r>
-              <a:rPr lang="fr-FR" sz="1600" dirty="0">
-                <a:solidFill>
-                  <a:schemeClr val="tx1"/>
-                </a:solidFill>
-              </a:rPr>
-              <a:t>Pour qui : </a:t>
-            </a:r>
-          </a:p>
-          <a:p>
-            <a:r>
-              <a:rPr lang="fr-FR" sz="1200" dirty="0">
-                <a:solidFill>
-                  <a:schemeClr val="tx1"/>
-                </a:solidFill>
-              </a:rPr>
-              <a:t>Tout le monde et en particulier les personnes déficientes visuelles, cognitives ou ayant des troubles de l’attention</a:t>
-            </a:r>
-          </a:p>
-          <a:p>
-            <a:endParaRPr lang="fr-FR" sz="1200" dirty="0">
-              <a:solidFill>
-                <a:schemeClr val="tx1"/>
-              </a:solidFill>
-            </a:endParaRPr>
-          </a:p>
-          <a:p>
-            <a:r>
-              <a:rPr lang="fr-FR" sz="1600" dirty="0">
-                <a:solidFill>
-                  <a:schemeClr val="tx1"/>
-                </a:solidFill>
-              </a:rPr>
-              <a:t>Quand :</a:t>
-            </a:r>
-          </a:p>
-          <a:p>
-            <a:r>
-              <a:rPr lang="fr-FR" sz="1200" dirty="0">
-                <a:solidFill>
-                  <a:schemeClr val="tx1"/>
-                </a:solidFill>
-              </a:rPr>
-              <a:t>Dès la conception</a:t>
-            </a:r>
-          </a:p>
-          <a:p>
-            <a:endParaRPr lang="fr-FR" sz="1200" dirty="0">
-              <a:solidFill>
-                <a:schemeClr val="tx1"/>
-              </a:solidFill>
-            </a:endParaRPr>
-          </a:p>
-          <a:p>
-            <a:r>
-              <a:rPr lang="fr-FR" sz="1600" dirty="0">
-                <a:solidFill>
-                  <a:schemeClr val="tx1"/>
-                </a:solidFill>
-              </a:rPr>
-              <a:t>Description :</a:t>
-            </a:r>
-          </a:p>
-          <a:p>
-            <a:r>
-              <a:rPr lang="fr-FR" sz="1200" dirty="0">
-                <a:solidFill>
-                  <a:schemeClr val="tx1"/>
-                </a:solidFill>
-              </a:rPr>
-              <a:t>Fournir des moyens d’identifier et de distinguer visuellement les différentes parties de la page et assurer la cohérence de ces régions ou regroupements dans toutes les pages</a:t>
-            </a:r>
-          </a:p>
-          <a:p>
-            <a:endParaRPr lang="fr-FR" sz="1200" dirty="0">
-              <a:solidFill>
-                <a:schemeClr val="tx1"/>
-              </a:solidFill>
-            </a:endParaRPr>
-          </a:p>
-          <a:p>
-            <a:r>
-              <a:rPr lang="fr-FR" sz="1600" dirty="0">
-                <a:solidFill>
-                  <a:schemeClr val="tx1"/>
-                </a:solidFill>
-              </a:rPr>
-              <a:t>À vérifier :</a:t>
-            </a:r>
-          </a:p>
-          <a:p>
-            <a:pPr marL="171450" indent="-171450">
-              <a:buFont typeface="Arial" panose="020B0604020202020204" pitchFamily="34" charset="0"/>
-              <a:buChar char="•"/>
-            </a:pPr>
-            <a:r>
-              <a:rPr lang="fr-FR" sz="1200" dirty="0">
-                <a:solidFill>
-                  <a:schemeClr val="tx1"/>
-                </a:solidFill>
-              </a:rPr>
-              <a:t>S'assurer que les liens dans le corps du texte sont facilement identifiables visuellement par un autre moyen que la couleur (souligné, gras…) par rapport au reste du texte.</a:t>
-            </a:r>
-          </a:p>
-          <a:p>
-            <a:pPr marL="171450" indent="-171450">
-              <a:buFont typeface="Arial" panose="020B0604020202020204" pitchFamily="34" charset="0"/>
-              <a:buChar char="•"/>
-            </a:pPr>
-            <a:r>
-              <a:rPr lang="fr-FR" sz="1200" dirty="0">
-                <a:solidFill>
-                  <a:schemeClr val="tx1"/>
-                </a:solidFill>
-              </a:rPr>
-              <a:t>S’assurer que les mécanismes de navigation sont toujours situés au même endroit dans un ensemble de page.</a:t>
-            </a:r>
-          </a:p>
-          <a:p>
-            <a:pPr marL="171450" indent="-171450">
-              <a:buFont typeface="Arial" panose="020B0604020202020204" pitchFamily="34" charset="0"/>
-              <a:buChar char="•"/>
-            </a:pPr>
-            <a:r>
-              <a:rPr lang="fr-FR" sz="1200">
-                <a:solidFill>
-                  <a:schemeClr val="tx1"/>
-                </a:solidFill>
-              </a:rPr>
-              <a:t>S’assurer </a:t>
-            </a:r>
-            <a:r>
-              <a:rPr lang="fr-FR" sz="1200" dirty="0">
-                <a:solidFill>
-                  <a:schemeClr val="tx1"/>
-                </a:solidFill>
-              </a:rPr>
-              <a:t>que les composants et les regroupements qui ont la même fonction, sont identifiés (visuellement) de la même façon et, dans la mesure du possible, respecter l’apparence classique de ces éléments pour ne pas perturber l’utilisateur habitué à un aspect spécifique de ceux-ci (par exemple, les liens sont généralement soulignés…).</a:t>
-            </a:r>
-          </a:p>
-          <a:p>
-            <a:pPr marL="171450" indent="-171450">
-              <a:buFont typeface="Arial" panose="020B0604020202020204" pitchFamily="34" charset="0"/>
-              <a:buChar char="•"/>
-            </a:pPr>
-            <a:r>
-              <a:rPr lang="fr-FR" sz="1200">
-                <a:solidFill>
-                  <a:schemeClr val="tx1"/>
-                </a:solidFill>
-              </a:rPr>
-              <a:t>S’assurer </a:t>
-            </a:r>
-            <a:r>
-              <a:rPr lang="fr-FR" sz="1200" dirty="0">
-                <a:solidFill>
-                  <a:schemeClr val="tx1"/>
-                </a:solidFill>
-              </a:rPr>
-              <a:t>que les zones de la page sont clairement délimitées (bordures, filets, contraste suffisant…) ou qu’il y a un moyen de distinguer visuellement les groupes (sous-menu, liste déroulante…) ainsi que les différentes régions de la page.</a:t>
-            </a:r>
-          </a:p>
-          <a:p>
-            <a:endParaRPr lang="fr-FR" sz="1200" dirty="0">
-              <a:solidFill>
-                <a:schemeClr val="tx1"/>
-              </a:solidFill>
-            </a:endParaRPr>
-          </a:p>
-        </p:txBody>
-      </p:sp>
-    </p:spTree>
-    <p:extLst>
-      <p:ext uri="{BB962C8B-B14F-4D97-AF65-F5344CB8AC3E}">
-        <p14:creationId xmlns:p14="http://schemas.microsoft.com/office/powerpoint/2010/main" val="3817232508"/>
-      </p:ext>
-    </p:extLst>
-  </p:cSld>
-  <p:clrMapOvr>
-    <a:masterClrMapping/>
-  </p:clrMapOvr>
-  <p:transition spd="med">
-    <p:fade/>
-  </p:transition>
-</p:sld>
-</file>
-
-<file path=ppt/slides/slide56.xml><?xml version="1.0" encoding="utf-8"?>
-<p:sld xmlns:a="http://schemas.openxmlformats.org/drawingml/2006/main" xmlns:r="http://schemas.openxmlformats.org/officeDocument/2006/relationships" xmlns:p="http://schemas.openxmlformats.org/presentationml/2006/main">
-  <p:cSld>
-    <p:spTree>
-      <p:nvGrpSpPr>
-        <p:cNvPr id="1" name=""/>
-        <p:cNvGrpSpPr/>
-        <p:nvPr/>
-      </p:nvGrpSpPr>
-      <p:grpSpPr>
-        <a:xfrm>
-          <a:off x="0" y="0"/>
-          <a:ext cx="0" cy="0"/>
-          <a:chOff x="0" y="0"/>
-          <a:chExt cx="0" cy="0"/>
-        </a:xfrm>
-      </p:grpSpPr>
-      <p:sp>
-        <p:nvSpPr>
-          <p:cNvPr id="2" name="Espace réservé du contenu 1"/>
-          <p:cNvSpPr>
-            <a:spLocks noGrp="1"/>
-          </p:cNvSpPr>
-          <p:nvPr>
-            <p:ph idx="1"/>
-          </p:nvPr>
-        </p:nvSpPr>
-        <p:spPr/>
-        <p:txBody>
-          <a:bodyPr/>
-          <a:lstStyle/>
-          <a:p>
-            <a:r>
               <a:rPr lang="fr-FR" dirty="0"/>
               <a:t>Les techniques utiles en pratique</a:t>
             </a:r>
@@ -31125,7 +30968,7 @@
 </p:sld>
 </file>
 
-<file path=ppt/slides/slide57.xml><?xml version="1.0" encoding="utf-8"?>
+<file path=ppt/slides/slide56.xml><?xml version="1.0" encoding="utf-8"?>
 <p:sld xmlns:a="http://schemas.openxmlformats.org/drawingml/2006/main" xmlns:r="http://schemas.openxmlformats.org/officeDocument/2006/relationships" xmlns:p="http://schemas.openxmlformats.org/presentationml/2006/main">
   <p:cSld>
     <p:spTree>
@@ -31895,7 +31738,7 @@
 </p:sld>
 </file>
 
-<file path=ppt/slides/slide58.xml><?xml version="1.0" encoding="utf-8"?>
+<file path=ppt/slides/slide57.xml><?xml version="1.0" encoding="utf-8"?>
 <p:sld xmlns:a="http://schemas.openxmlformats.org/drawingml/2006/main" xmlns:r="http://schemas.openxmlformats.org/officeDocument/2006/relationships" xmlns:p="http://schemas.openxmlformats.org/presentationml/2006/main">
   <p:cSld>
     <p:spTree>

</xml_diff>